<commit_message>
added notes for midterm demo slides
Summary: incoming bs... added a ton of random words to the notes for our midterm demo slides

Test Plan: step 1. try not to cry; step 2. cry a lot

Reviewers: rpeng, jane, tnu

Reviewed By: tnu

Differential Revision: http://216.58.1.115:9000/D28
</commit_message>
<xml_diff>
--- a/documents/midterm_demo.pptx
+++ b/documents/midterm_demo.pptx
@@ -13,12 +13,12 @@
     <p:sldId id="261" r:id="rId4"/>
     <p:sldId id="263" r:id="rId5"/>
     <p:sldId id="262" r:id="rId6"/>
-    <p:sldId id="264" r:id="rId7"/>
-    <p:sldId id="265" r:id="rId8"/>
-    <p:sldId id="259" r:id="rId9"/>
-    <p:sldId id="268" r:id="rId10"/>
+    <p:sldId id="265" r:id="rId7"/>
+    <p:sldId id="259" r:id="rId8"/>
+    <p:sldId id="268" r:id="rId9"/>
+    <p:sldId id="269" r:id="rId10"/>
     <p:sldId id="260" r:id="rId11"/>
-    <p:sldId id="269" r:id="rId12"/>
+    <p:sldId id="264" r:id="rId12"/>
     <p:sldId id="270" r:id="rId13"/>
   </p:sldIdLst>
   <p:sldSz cx="9144000" cy="6858000" type="screen4x3"/>
@@ -515,32 +515,31 @@
           <a:bodyPr/>
           <a:lstStyle/>
           <a:p>
-            <a:pPr marL="171450" indent="-171450">
-              <a:buFontTx/>
-              <a:buChar char="-"/>
-            </a:pPr>
-            <a:r>
-              <a:rPr lang="en-US" baseline="0" dirty="0" smtClean="0"/>
-              <a:t>Focused on super simple user experience, targeting layman / non technical folk / small businesses</a:t>
-            </a:r>
-          </a:p>
-          <a:p>
-            <a:pPr marL="0" indent="0">
-              <a:buFontTx/>
-              <a:buNone/>
-            </a:pPr>
-            <a:r>
-              <a:rPr lang="en-US" dirty="0" smtClean="0"/>
-              <a:t>-</a:t>
-            </a:r>
-            <a:r>
-              <a:rPr lang="en-US" baseline="0" dirty="0" smtClean="0"/>
-              <a:t> </a:t>
-            </a:r>
-            <a:r>
-              <a:rPr lang="en-US" dirty="0" smtClean="0"/>
-              <a:t>Software + Hardware</a:t>
-            </a:r>
+            <a:r>
+              <a:rPr lang="en-CA" dirty="0" smtClean="0"/>
+              <a:t>Hey guys,</a:t>
+            </a:r>
+            <a:r>
+              <a:rPr lang="en-CA" baseline="0" dirty="0" smtClean="0"/>
+              <a:t> we’re </a:t>
+            </a:r>
+            <a:r>
+              <a:rPr lang="en-CA" baseline="0" dirty="0" err="1" smtClean="0"/>
+              <a:t>Ailurus</a:t>
+            </a:r>
+            <a:r>
+              <a:rPr lang="en-CA" baseline="0" dirty="0" smtClean="0"/>
+              <a:t> and our product is… </a:t>
+            </a:r>
+            <a:r>
+              <a:rPr lang="en-CA" baseline="0" dirty="0" err="1" smtClean="0"/>
+              <a:t>Ailurus</a:t>
+            </a:r>
+            <a:r>
+              <a:rPr lang="en-CA" baseline="0" dirty="0" smtClean="0"/>
+              <a:t>!</a:t>
+            </a:r>
+            <a:endParaRPr lang="en-CA" dirty="0"/>
           </a:p>
         </p:txBody>
       </p:sp>
@@ -561,7 +560,7 @@
           <a:p>
             <a:fld id="{6100224D-0E9C-C04C-8D85-E4CE9ACE5D30}" type="slidenum">
               <a:rPr lang="en-US" smtClean="0"/>
-              <a:t>2</a:t>
+              <a:t>1</a:t>
             </a:fld>
             <a:endParaRPr lang="en-US"/>
           </a:p>
@@ -570,7 +569,7 @@
     </p:spTree>
     <p:extLst>
       <p:ext uri="{BB962C8B-B14F-4D97-AF65-F5344CB8AC3E}">
-        <p14:creationId xmlns:p14="http://schemas.microsoft.com/office/powerpoint/2010/main" val="2744595537"/>
+        <p14:creationId xmlns:p14="http://schemas.microsoft.com/office/powerpoint/2010/main" val="3313199608"/>
       </p:ext>
     </p:extLst>
   </p:cSld>
@@ -624,33 +623,140 @@
           <a:bodyPr/>
           <a:lstStyle/>
           <a:p>
+            <a:pPr marL="0" indent="0">
+              <a:buFontTx/>
+              <a:buNone/>
+            </a:pPr>
             <a:r>
               <a:rPr lang="en-US" baseline="0" dirty="0" smtClean="0"/>
-              <a:t>Web interface written in Java using Google Web Toolkit</a:t>
-            </a:r>
-          </a:p>
-          <a:p>
+              <a:t>For our packaging system:</a:t>
+            </a:r>
+          </a:p>
+          <a:p>
+            <a:pPr marL="171450" indent="-171450">
+              <a:buFontTx/>
+              <a:buChar char="-"/>
+            </a:pPr>
             <a:r>
               <a:rPr lang="en-US" baseline="0" dirty="0" smtClean="0"/>
-              <a:t>Dependency management and build done using maven</a:t>
-            </a:r>
-          </a:p>
-          <a:p>
+              <a:t>First, applications </a:t>
+            </a:r>
             <a:r>
               <a:rPr lang="en-US" baseline="0" dirty="0" smtClean="0"/>
-              <a:t>Backend written in Python</a:t>
-            </a:r>
-          </a:p>
-          <a:p>
+              <a:t>are </a:t>
+            </a:r>
             <a:r>
               <a:rPr lang="en-US" baseline="0" dirty="0" smtClean="0"/>
-              <a:t>Running on </a:t>
+              <a:t>wrapped as bundles </a:t>
+            </a:r>
+            <a:r>
+              <a:rPr lang="en-US" baseline="0" dirty="0" smtClean="0"/>
+              <a:t>containing an installation script and an configuration files needed for </a:t>
+            </a:r>
+            <a:r>
+              <a:rPr lang="en-US" baseline="0" dirty="0" smtClean="0"/>
+              <a:t>setup, as well as some basic information such as a download source and validation checksum</a:t>
+            </a:r>
+            <a:endParaRPr lang="en-US" baseline="0" dirty="0" smtClean="0"/>
+          </a:p>
+          <a:p>
+            <a:pPr marL="171450" indent="-171450">
+              <a:buFontTx/>
+              <a:buChar char="-"/>
+            </a:pPr>
+            <a:r>
+              <a:rPr lang="en-US" baseline="0" dirty="0" smtClean="0"/>
+              <a:t>Now, we expose a </a:t>
+            </a:r>
+            <a:r>
+              <a:rPr lang="en-US" baseline="0" dirty="0" smtClean="0"/>
+              <a:t>setup tool </a:t>
+            </a:r>
+            <a:r>
+              <a:rPr lang="en-US" baseline="0" dirty="0" smtClean="0"/>
+              <a:t>that may be invoked via command </a:t>
+            </a:r>
+            <a:r>
+              <a:rPr lang="en-US" baseline="0" dirty="0" smtClean="0"/>
+              <a:t>line </a:t>
+            </a:r>
+            <a:r>
+              <a:rPr lang="en-US" baseline="0" dirty="0" smtClean="0"/>
+              <a:t>that will </a:t>
+            </a:r>
+            <a:r>
+              <a:rPr lang="en-US" baseline="0" dirty="0" smtClean="0"/>
+              <a:t>install a specified app</a:t>
+            </a:r>
+          </a:p>
+          <a:p>
+            <a:pPr marL="628650" lvl="1" indent="-171450">
+              <a:buFontTx/>
+              <a:buChar char="-"/>
+            </a:pPr>
+            <a:r>
+              <a:rPr lang="en-US" baseline="0" dirty="0" smtClean="0"/>
+              <a:t>This is done using our custom command “</a:t>
             </a:r>
             <a:r>
               <a:rPr lang="en-US" baseline="0" dirty="0" err="1" smtClean="0"/>
-              <a:t>nginx</a:t>
+              <a:t>ai</a:t>
+            </a:r>
+            <a:r>
+              <a:rPr lang="en-US" baseline="0" dirty="0" smtClean="0"/>
+              <a:t>-get install path/to/</a:t>
+            </a:r>
+            <a:r>
+              <a:rPr lang="en-US" baseline="0" dirty="0" smtClean="0"/>
+              <a:t>package”</a:t>
             </a:r>
             <a:endParaRPr lang="en-US" baseline="0" dirty="0" smtClean="0"/>
+          </a:p>
+          <a:p>
+            <a:pPr marL="171450" lvl="0" indent="-171450">
+              <a:buFontTx/>
+              <a:buChar char="-"/>
+            </a:pPr>
+            <a:r>
+              <a:rPr lang="en-US" baseline="0" dirty="0" smtClean="0"/>
+              <a:t>During the installation process, the packaging system will </a:t>
+            </a:r>
+            <a:r>
+              <a:rPr lang="en-US" baseline="0" dirty="0" smtClean="0"/>
+              <a:t>check an application cache </a:t>
+            </a:r>
+            <a:r>
+              <a:rPr lang="en-US" baseline="0" dirty="0" smtClean="0"/>
+              <a:t>to see if the app has been downloaded previously.</a:t>
+            </a:r>
+          </a:p>
+          <a:p>
+            <a:pPr marL="628650" lvl="1" indent="-171450">
+              <a:buFontTx/>
+              <a:buChar char="-"/>
+            </a:pPr>
+            <a:r>
+              <a:rPr lang="en-US" baseline="0" dirty="0" smtClean="0"/>
+              <a:t>If the application isn’t found, or we find that it is corrupted due to a mismatching validation checksum, we download </a:t>
+            </a:r>
+            <a:r>
+              <a:rPr lang="en-US" baseline="0" dirty="0" smtClean="0"/>
+              <a:t>the application from a URL provided by the application </a:t>
+            </a:r>
+            <a:r>
+              <a:rPr lang="en-US" baseline="0" dirty="0" smtClean="0"/>
+              <a:t>bundle</a:t>
+            </a:r>
+          </a:p>
+          <a:p>
+            <a:pPr marL="171450" lvl="0" indent="-171450">
+              <a:buFontTx/>
+              <a:buChar char="-"/>
+            </a:pPr>
+            <a:r>
+              <a:rPr lang="en-US" baseline="0" dirty="0" smtClean="0"/>
+              <a:t>Finally, after the application is verified, we copy over the necessary files and complete any configuration that needs to be done</a:t>
+            </a:r>
           </a:p>
         </p:txBody>
       </p:sp>
@@ -671,7 +777,7 @@
           <a:p>
             <a:fld id="{6100224D-0E9C-C04C-8D85-E4CE9ACE5D30}" type="slidenum">
               <a:rPr lang="en-US" smtClean="0"/>
-              <a:t>11</a:t>
+              <a:t>10</a:t>
             </a:fld>
             <a:endParaRPr lang="en-US"/>
           </a:p>
@@ -743,6 +849,346 @@
                 <a:ea typeface="+mn-ea"/>
                 <a:cs typeface="+mn-cs"/>
               </a:rPr>
+              <a:t>UI Mockups – Since the user interface is such a strong focus for us, we went through several different design mockups. We eventually decided on a style similar to what you’re seeing right now.</a:t>
+            </a:r>
+          </a:p>
+          <a:p>
+            <a:endParaRPr lang="en-US" altLang="ja-JP" sz="1200" kern="1200" baseline="0" dirty="0" smtClean="0">
+              <a:solidFill>
+                <a:schemeClr val="tx1"/>
+              </a:solidFill>
+              <a:latin typeface="+mn-lt"/>
+              <a:ea typeface="+mn-ea"/>
+              <a:cs typeface="+mn-cs"/>
+            </a:endParaRPr>
+          </a:p>
+          <a:p>
+            <a:r>
+              <a:rPr lang="en-US" altLang="ja-JP" sz="1200" kern="1200" baseline="0" dirty="0" smtClean="0">
+                <a:solidFill>
+                  <a:schemeClr val="tx1"/>
+                </a:solidFill>
+                <a:latin typeface="+mn-lt"/>
+                <a:ea typeface="+mn-ea"/>
+                <a:cs typeface="+mn-cs"/>
+              </a:rPr>
+              <a:t>Two Hardware </a:t>
+            </a:r>
+            <a:r>
+              <a:rPr lang="en-US" altLang="ja-JP" sz="1200" kern="1200" baseline="0" dirty="0" smtClean="0">
+                <a:solidFill>
+                  <a:schemeClr val="tx1"/>
+                </a:solidFill>
+                <a:latin typeface="+mn-lt"/>
+                <a:ea typeface="+mn-ea"/>
+                <a:cs typeface="+mn-cs"/>
+              </a:rPr>
+              <a:t>Prototypes – We initially bought a Raspberry Pi to work with, but we began development on a </a:t>
+            </a:r>
+            <a:r>
+              <a:rPr lang="en-US" altLang="ja-JP" sz="1200" kern="1200" baseline="0" dirty="0" err="1" smtClean="0">
+                <a:solidFill>
+                  <a:schemeClr val="tx1"/>
+                </a:solidFill>
+                <a:latin typeface="+mn-lt"/>
+                <a:ea typeface="+mn-ea"/>
+                <a:cs typeface="+mn-cs"/>
+              </a:rPr>
+              <a:t>Cubieboard</a:t>
+            </a:r>
+            <a:r>
+              <a:rPr lang="en-US" altLang="ja-JP" sz="1200" kern="1200" baseline="0" dirty="0" smtClean="0">
+                <a:solidFill>
+                  <a:schemeClr val="tx1"/>
+                </a:solidFill>
+                <a:latin typeface="+mn-lt"/>
+                <a:ea typeface="+mn-ea"/>
+                <a:cs typeface="+mn-cs"/>
+              </a:rPr>
+              <a:t> as a possible alternative.</a:t>
+            </a:r>
+          </a:p>
+          <a:p>
+            <a:endParaRPr lang="en-US" altLang="ja-JP" sz="1200" kern="1200" baseline="0" dirty="0" smtClean="0">
+              <a:solidFill>
+                <a:schemeClr val="tx1"/>
+              </a:solidFill>
+              <a:latin typeface="+mn-lt"/>
+              <a:ea typeface="+mn-ea"/>
+              <a:cs typeface="+mn-cs"/>
+            </a:endParaRPr>
+          </a:p>
+          <a:p>
+            <a:r>
+              <a:rPr lang="en-US" altLang="ja-JP" sz="1200" kern="1200" baseline="0" dirty="0" smtClean="0">
+                <a:solidFill>
+                  <a:schemeClr val="tx1"/>
+                </a:solidFill>
+                <a:latin typeface="+mn-lt"/>
+                <a:ea typeface="+mn-ea"/>
+                <a:cs typeface="+mn-cs"/>
+              </a:rPr>
+              <a:t>Working Packaging </a:t>
+            </a:r>
+            <a:r>
+              <a:rPr lang="en-US" altLang="ja-JP" sz="1200" kern="1200" baseline="0" dirty="0" smtClean="0">
+                <a:solidFill>
+                  <a:schemeClr val="tx1"/>
+                </a:solidFill>
+                <a:latin typeface="+mn-lt"/>
+                <a:ea typeface="+mn-ea"/>
+                <a:cs typeface="+mn-cs"/>
+              </a:rPr>
+              <a:t>System – We wanted a simple, yet robust, way to install applications so that it could all be handled without user configuration.</a:t>
+            </a:r>
+          </a:p>
+          <a:p>
+            <a:endParaRPr lang="en-US" altLang="ja-JP" sz="1200" kern="1200" baseline="0" dirty="0" smtClean="0">
+              <a:solidFill>
+                <a:schemeClr val="tx1"/>
+              </a:solidFill>
+              <a:latin typeface="+mn-lt"/>
+              <a:ea typeface="+mn-ea"/>
+              <a:cs typeface="+mn-cs"/>
+            </a:endParaRPr>
+          </a:p>
+          <a:p>
+            <a:r>
+              <a:rPr lang="en-US" altLang="ja-JP" sz="1200" kern="1200" baseline="0" dirty="0" smtClean="0">
+                <a:solidFill>
+                  <a:schemeClr val="tx1"/>
+                </a:solidFill>
+                <a:latin typeface="+mn-lt"/>
+                <a:ea typeface="+mn-ea"/>
+                <a:cs typeface="+mn-cs"/>
+              </a:rPr>
+              <a:t>Research </a:t>
+            </a:r>
+            <a:r>
+              <a:rPr lang="en-US" altLang="ja-JP" sz="1200" kern="1200" baseline="0" dirty="0" smtClean="0">
+                <a:solidFill>
+                  <a:schemeClr val="tx1"/>
+                </a:solidFill>
+                <a:latin typeface="+mn-lt"/>
+                <a:ea typeface="+mn-ea"/>
+                <a:cs typeface="+mn-cs"/>
+              </a:rPr>
+              <a:t>Competition – We had to scope out related products to see our competition and decide what our main focuses would be in order to differentiate.</a:t>
+            </a:r>
+          </a:p>
+          <a:p>
+            <a:endParaRPr lang="en-US" altLang="ja-JP" sz="1200" kern="1200" baseline="0" dirty="0" smtClean="0">
+              <a:solidFill>
+                <a:schemeClr val="tx1"/>
+              </a:solidFill>
+              <a:latin typeface="+mn-lt"/>
+              <a:ea typeface="+mn-ea"/>
+              <a:cs typeface="+mn-cs"/>
+            </a:endParaRPr>
+          </a:p>
+          <a:p>
+            <a:r>
+              <a:rPr lang="en-US" altLang="ja-JP" sz="1200" kern="1200" baseline="0" dirty="0" smtClean="0">
+                <a:solidFill>
+                  <a:schemeClr val="tx1"/>
+                </a:solidFill>
+                <a:latin typeface="+mn-lt"/>
+                <a:ea typeface="+mn-ea"/>
+                <a:cs typeface="+mn-cs"/>
+              </a:rPr>
+              <a:t>Basic Admin Web </a:t>
+            </a:r>
+            <a:r>
+              <a:rPr lang="en-US" altLang="ja-JP" sz="1200" kern="1200" baseline="0" dirty="0" smtClean="0">
+                <a:solidFill>
+                  <a:schemeClr val="tx1"/>
+                </a:solidFill>
+                <a:latin typeface="+mn-lt"/>
+                <a:ea typeface="+mn-ea"/>
+                <a:cs typeface="+mn-cs"/>
+              </a:rPr>
+              <a:t>Server – Essentially the crux of our product, we needed to get an administrative web server working for us to build off of.</a:t>
+            </a:r>
+          </a:p>
+          <a:p>
+            <a:endParaRPr lang="en-US" altLang="ja-JP" sz="1200" kern="1200" baseline="0" dirty="0" smtClean="0">
+              <a:solidFill>
+                <a:schemeClr val="tx1"/>
+              </a:solidFill>
+              <a:latin typeface="+mn-lt"/>
+              <a:ea typeface="+mn-ea"/>
+              <a:cs typeface="+mn-cs"/>
+            </a:endParaRPr>
+          </a:p>
+          <a:p>
+            <a:r>
+              <a:rPr lang="en-US" altLang="ja-JP" sz="1200" kern="1200" baseline="0" dirty="0" smtClean="0">
+                <a:solidFill>
+                  <a:schemeClr val="tx1"/>
+                </a:solidFill>
+                <a:latin typeface="+mn-lt"/>
+                <a:ea typeface="+mn-ea"/>
+                <a:cs typeface="+mn-cs"/>
+              </a:rPr>
+              <a:t>There are a few objectives which were uncompleted and fall into our backlog.</a:t>
+            </a:r>
+          </a:p>
+          <a:p>
+            <a:endParaRPr lang="en-US" altLang="ja-JP" sz="1200" kern="1200" baseline="0" dirty="0" smtClean="0">
+              <a:solidFill>
+                <a:schemeClr val="tx1"/>
+              </a:solidFill>
+              <a:latin typeface="+mn-lt"/>
+              <a:ea typeface="+mn-ea"/>
+              <a:cs typeface="+mn-cs"/>
+            </a:endParaRPr>
+          </a:p>
+          <a:p>
+            <a:r>
+              <a:rPr lang="en-US" altLang="ja-JP" sz="1200" kern="1200" baseline="0" dirty="0" smtClean="0">
+                <a:solidFill>
+                  <a:schemeClr val="tx1"/>
+                </a:solidFill>
+                <a:latin typeface="+mn-lt"/>
+                <a:ea typeface="+mn-ea"/>
+                <a:cs typeface="+mn-cs"/>
+              </a:rPr>
+              <a:t>Consult </a:t>
+            </a:r>
+            <a:r>
+              <a:rPr lang="en-US" altLang="ja-JP" sz="1200" kern="1200" baseline="0" dirty="0" smtClean="0">
+                <a:solidFill>
+                  <a:schemeClr val="tx1"/>
+                </a:solidFill>
+                <a:latin typeface="+mn-lt"/>
+                <a:ea typeface="+mn-ea"/>
+                <a:cs typeface="+mn-cs"/>
+              </a:rPr>
+              <a:t>Customers – We spoke with a few interested customers last year, but have yet to reconvene with them in order to evaluate our direction.</a:t>
+            </a:r>
+          </a:p>
+          <a:p>
+            <a:endParaRPr lang="en-US" altLang="ja-JP" sz="1200" kern="1200" baseline="0" dirty="0" smtClean="0">
+              <a:solidFill>
+                <a:schemeClr val="tx1"/>
+              </a:solidFill>
+              <a:latin typeface="+mn-lt"/>
+              <a:ea typeface="+mn-ea"/>
+              <a:cs typeface="+mn-cs"/>
+            </a:endParaRPr>
+          </a:p>
+          <a:p>
+            <a:r>
+              <a:rPr lang="en-US" altLang="ja-JP" sz="1200" kern="1200" baseline="0" dirty="0" smtClean="0">
+                <a:solidFill>
+                  <a:schemeClr val="tx1"/>
+                </a:solidFill>
+                <a:latin typeface="+mn-lt"/>
+                <a:ea typeface="+mn-ea"/>
+                <a:cs typeface="+mn-cs"/>
+              </a:rPr>
+              <a:t>Domain Name Service – This service will likely be realized later in the project lifecycle.</a:t>
+            </a:r>
+            <a:endParaRPr lang="en-US" altLang="ja-JP" sz="1200" kern="1200" baseline="0" dirty="0" smtClean="0">
+              <a:solidFill>
+                <a:schemeClr val="tx1"/>
+              </a:solidFill>
+              <a:latin typeface="+mn-lt"/>
+              <a:ea typeface="+mn-ea"/>
+              <a:cs typeface="+mn-cs"/>
+            </a:endParaRPr>
+          </a:p>
+        </p:txBody>
+      </p:sp>
+      <p:sp>
+        <p:nvSpPr>
+          <p:cNvPr id="4" name="Slide Number Placeholder 3"/>
+          <p:cNvSpPr>
+            <a:spLocks noGrp="1"/>
+          </p:cNvSpPr>
+          <p:nvPr>
+            <p:ph type="sldNum" sz="quarter" idx="10"/>
+          </p:nvPr>
+        </p:nvSpPr>
+        <p:spPr/>
+        <p:txBody>
+          <a:bodyPr/>
+          <a:lstStyle/>
+          <a:p>
+            <a:fld id="{6100224D-0E9C-C04C-8D85-E4CE9ACE5D30}" type="slidenum">
+              <a:rPr lang="en-US" smtClean="0"/>
+              <a:t>11</a:t>
+            </a:fld>
+            <a:endParaRPr lang="en-US"/>
+          </a:p>
+        </p:txBody>
+      </p:sp>
+    </p:spTree>
+    <p:extLst>
+      <p:ext uri="{BB962C8B-B14F-4D97-AF65-F5344CB8AC3E}">
+        <p14:creationId xmlns:p14="http://schemas.microsoft.com/office/powerpoint/2010/main" val="2744595537"/>
+      </p:ext>
+    </p:extLst>
+  </p:cSld>
+  <p:clrMapOvr>
+    <a:masterClrMapping/>
+  </p:clrMapOvr>
+</p:notes>
+</file>
+
+<file path=ppt/notesSlides/notesSlide12.xml><?xml version="1.0" encoding="utf-8"?>
+<p:notes xmlns:a="http://schemas.openxmlformats.org/drawingml/2006/main" xmlns:r="http://schemas.openxmlformats.org/officeDocument/2006/relationships" xmlns:p="http://schemas.openxmlformats.org/presentationml/2006/main">
+  <p:cSld>
+    <p:spTree>
+      <p:nvGrpSpPr>
+        <p:cNvPr id="1" name=""/>
+        <p:cNvGrpSpPr/>
+        <p:nvPr/>
+      </p:nvGrpSpPr>
+      <p:grpSpPr>
+        <a:xfrm>
+          <a:off x="0" y="0"/>
+          <a:ext cx="0" cy="0"/>
+          <a:chOff x="0" y="0"/>
+          <a:chExt cx="0" cy="0"/>
+        </a:xfrm>
+      </p:grpSpPr>
+      <p:sp>
+        <p:nvSpPr>
+          <p:cNvPr id="2" name="Slide Image Placeholder 1"/>
+          <p:cNvSpPr>
+            <a:spLocks noGrp="1" noRot="1" noChangeAspect="1"/>
+          </p:cNvSpPr>
+          <p:nvPr>
+            <p:ph type="sldImg"/>
+          </p:nvPr>
+        </p:nvSpPr>
+        <p:spPr/>
+      </p:sp>
+      <p:sp>
+        <p:nvSpPr>
+          <p:cNvPr id="3" name="Notes Placeholder 2"/>
+          <p:cNvSpPr>
+            <a:spLocks noGrp="1"/>
+          </p:cNvSpPr>
+          <p:nvPr>
+            <p:ph type="body" idx="1"/>
+          </p:nvPr>
+        </p:nvSpPr>
+        <p:spPr/>
+        <p:txBody>
+          <a:bodyPr/>
+          <a:lstStyle/>
+          <a:p>
+            <a:r>
+              <a:rPr lang="en-US" altLang="ja-JP" sz="1200" kern="1200" baseline="0" dirty="0" smtClean="0">
+                <a:solidFill>
+                  <a:schemeClr val="tx1"/>
+                </a:solidFill>
+                <a:latin typeface="+mn-lt"/>
+                <a:ea typeface="+mn-ea"/>
+                <a:cs typeface="+mn-cs"/>
+              </a:rPr>
               <a:t>Please don</a:t>
             </a:r>
             <a:r>
@@ -855,97 +1301,142 @@
               <a:buNone/>
             </a:pPr>
             <a:r>
-              <a:rPr lang="en-US" dirty="0" err="1" smtClean="0"/>
-              <a:t>Synology</a:t>
-            </a:r>
-            <a:r>
               <a:rPr lang="en-US" baseline="0" dirty="0" smtClean="0"/>
-              <a:t> + QNAP </a:t>
+              <a:t>So, about </a:t>
             </a:r>
             <a:r>
               <a:rPr lang="en-US" baseline="0" dirty="0" err="1" smtClean="0"/>
-              <a:t>kinda</a:t>
+              <a:t>Ailurus</a:t>
+            </a:r>
+            <a:r>
+              <a:rPr lang="en-US" baseline="0" dirty="0" smtClean="0"/>
+              <a:t>:</a:t>
+            </a:r>
+          </a:p>
+          <a:p>
+            <a:pPr marL="0" indent="0">
+              <a:buFontTx/>
+              <a:buNone/>
+            </a:pPr>
+            <a:r>
+              <a:rPr lang="en-US" baseline="0" dirty="0" smtClean="0"/>
+              <a:t>For individuals or small businesses, setting up a presence on the web can be a daunting, risky task when you have a light budget and little technical knowledge.</a:t>
+            </a:r>
+          </a:p>
+          <a:p>
+            <a:pPr marL="0" indent="0">
+              <a:buFontTx/>
+              <a:buNone/>
+            </a:pPr>
+            <a:r>
+              <a:rPr lang="en-US" baseline="0" dirty="0" smtClean="0"/>
+              <a:t>That’s why </a:t>
+            </a:r>
+            <a:r>
+              <a:rPr lang="en-US" baseline="0" dirty="0" err="1" smtClean="0"/>
+              <a:t>Ailurus</a:t>
+            </a:r>
+            <a:r>
+              <a:rPr lang="en-US" baseline="0" dirty="0" smtClean="0"/>
+              <a:t> aims to be a versatile solution covering the software, hardware, and service aspects.</a:t>
+            </a:r>
+          </a:p>
+          <a:p>
+            <a:pPr marL="0" indent="0">
+              <a:buFontTx/>
+              <a:buNone/>
+            </a:pPr>
+            <a:endParaRPr lang="en-US" baseline="0" dirty="0" smtClean="0"/>
+          </a:p>
+          <a:p>
+            <a:pPr marL="0" indent="0">
+              <a:buFontTx/>
+              <a:buNone/>
+            </a:pPr>
+            <a:r>
+              <a:rPr lang="en-US" baseline="0" dirty="0" smtClean="0"/>
+              <a:t>First, we provide a web platform. This includes an administration interface for managing your web server and an app store for installing web applications.</a:t>
+            </a:r>
+          </a:p>
+          <a:p>
+            <a:pPr marL="0" indent="0">
+              <a:buFontTx/>
+              <a:buNone/>
+            </a:pPr>
+            <a:r>
+              <a:rPr lang="en-US" baseline="0" dirty="0" smtClean="0"/>
+              <a:t>Secondly, we provide a personal home server. This is in the form of a lightweight device, such as the raspberry pi, which you can run at home to host your server. This will be simple to set up and will give you 100% control of your data.</a:t>
+            </a:r>
+          </a:p>
+          <a:p>
+            <a:pPr marL="0" indent="0">
+              <a:buFontTx/>
+              <a:buNone/>
+            </a:pPr>
+            <a:r>
+              <a:rPr lang="en-US" baseline="0" dirty="0" smtClean="0"/>
+              <a:t>Thirdly, we plan to offer a service to provide domain names. We’ll let the user select what they want their server to be called, and we’ll hook up everything for them.</a:t>
+            </a:r>
+          </a:p>
+          <a:p>
+            <a:pPr marL="0" indent="0">
+              <a:buFontTx/>
+              <a:buNone/>
+            </a:pPr>
+            <a:endParaRPr lang="en-US" baseline="0" dirty="0" smtClean="0"/>
+          </a:p>
+          <a:p>
+            <a:pPr marL="0" indent="0">
+              <a:buFontTx/>
+              <a:buNone/>
+            </a:pPr>
+            <a:endParaRPr lang="en-US" baseline="0" dirty="0" smtClean="0"/>
+          </a:p>
+          <a:p>
+            <a:pPr marL="0" indent="0">
+              <a:buFontTx/>
+              <a:buNone/>
+            </a:pPr>
+            <a:endParaRPr lang="en-US" baseline="0" dirty="0" smtClean="0"/>
+          </a:p>
+          <a:p>
+            <a:pPr marL="0" indent="0">
+              <a:buFontTx/>
+              <a:buNone/>
+            </a:pPr>
+            <a:endParaRPr lang="en-US" baseline="0" dirty="0" smtClean="0"/>
+          </a:p>
+          <a:p>
+            <a:pPr marL="0" indent="0">
+              <a:buFontTx/>
+              <a:buNone/>
+            </a:pPr>
+            <a:r>
+              <a:rPr lang="en-US" baseline="0" dirty="0" smtClean="0"/>
+              <a:t>Focused </a:t>
+            </a:r>
+            <a:r>
+              <a:rPr lang="en-US" baseline="0" dirty="0" smtClean="0"/>
+              <a:t>on super simple user experience, targeting layman / non technical folk / small businesses</a:t>
+            </a:r>
+          </a:p>
+          <a:p>
+            <a:pPr marL="0" indent="0">
+              <a:buFontTx/>
+              <a:buNone/>
+            </a:pPr>
+            <a:r>
+              <a:rPr lang="en-US" dirty="0" smtClean="0"/>
+              <a:t>-</a:t>
             </a:r>
             <a:r>
               <a:rPr lang="en-US" baseline="0" dirty="0" smtClean="0"/>
               <a:t> </a:t>
             </a:r>
             <a:r>
-              <a:rPr lang="en-US" baseline="0" dirty="0" err="1" smtClean="0"/>
-              <a:t>simiar</a:t>
-            </a:r>
-            <a:endParaRPr lang="en-US" baseline="0" dirty="0" smtClean="0"/>
-          </a:p>
-          <a:p>
-            <a:pPr marL="0" indent="0">
-              <a:buFontTx/>
-              <a:buNone/>
-            </a:pPr>
-            <a:r>
-              <a:rPr lang="en-US" baseline="0" dirty="0" smtClean="0"/>
-              <a:t>- Main focus is </a:t>
-            </a:r>
-            <a:r>
-              <a:rPr lang="en-US" baseline="0" dirty="0" err="1" smtClean="0"/>
-              <a:t>nas</a:t>
-            </a:r>
-            <a:r>
-              <a:rPr lang="en-US" baseline="0" dirty="0" smtClean="0"/>
-              <a:t> with provided software and app store so you can install server-like apps</a:t>
-            </a:r>
-          </a:p>
-          <a:p>
-            <a:pPr marL="0" indent="0">
-              <a:buFontTx/>
-              <a:buNone/>
-            </a:pPr>
-            <a:endParaRPr lang="en-US" baseline="0" dirty="0" smtClean="0"/>
-          </a:p>
-          <a:p>
-            <a:pPr marL="0" indent="0">
-              <a:buFontTx/>
-              <a:buNone/>
-            </a:pPr>
-            <a:r>
-              <a:rPr lang="en-US" baseline="0" dirty="0" smtClean="0"/>
-              <a:t>WHS – purely software solution, no longer updated</a:t>
-            </a:r>
-          </a:p>
-          <a:p>
-            <a:pPr marL="0" indent="0">
-              <a:buFontTx/>
-              <a:buNone/>
-            </a:pPr>
-            <a:endParaRPr lang="en-US" baseline="0" dirty="0" smtClean="0"/>
-          </a:p>
-          <a:p>
-            <a:pPr marL="0" indent="0">
-              <a:buFontTx/>
-              <a:buNone/>
-            </a:pPr>
-            <a:r>
-              <a:rPr lang="en-US" baseline="0" dirty="0" smtClean="0"/>
-              <a:t>None of them are super easy to use and don’t help you get online</a:t>
-            </a:r>
-          </a:p>
-          <a:p>
-            <a:pPr marL="0" indent="0">
-              <a:buFontTx/>
-              <a:buNone/>
-            </a:pPr>
-            <a:r>
-              <a:rPr lang="en-US" baseline="0" dirty="0" smtClean="0"/>
-              <a:t>We don</a:t>
-            </a:r>
-            <a:r>
-              <a:rPr lang="fr-FR" baseline="0" dirty="0" smtClean="0"/>
-              <a:t>’</a:t>
-            </a:r>
-            <a:r>
-              <a:rPr lang="en-US" baseline="0" dirty="0" smtClean="0"/>
-              <a:t>t provide a NAS solution, but its easier to get the user online using our product</a:t>
-            </a:r>
-            <a:endParaRPr lang="en-US" dirty="0"/>
+              <a:rPr lang="en-US" dirty="0" smtClean="0"/>
+              <a:t>Software + Hardware</a:t>
+            </a:r>
           </a:p>
         </p:txBody>
       </p:sp>
@@ -966,7 +1457,7 @@
           <a:p>
             <a:fld id="{6100224D-0E9C-C04C-8D85-E4CE9ACE5D30}" type="slidenum">
               <a:rPr lang="en-US" smtClean="0"/>
-              <a:t>3</a:t>
+              <a:t>2</a:t>
             </a:fld>
             <a:endParaRPr lang="en-US"/>
           </a:p>
@@ -1029,87 +1520,73 @@
           <a:bodyPr/>
           <a:lstStyle/>
           <a:p>
-            <a:r>
-              <a:rPr lang="en-US" altLang="ja-JP" sz="1200" kern="1200" baseline="0" dirty="0" smtClean="0">
-                <a:solidFill>
-                  <a:schemeClr val="tx1"/>
-                </a:solidFill>
-                <a:latin typeface="+mn-lt"/>
-                <a:ea typeface="+mn-ea"/>
-                <a:cs typeface="+mn-cs"/>
-              </a:rPr>
-              <a:t>Aiming for around 50$, very inexpensive, low-risk for customer</a:t>
-            </a:r>
-          </a:p>
-          <a:p>
-            <a:endParaRPr lang="en-US" altLang="ja-JP" sz="1200" kern="1200" baseline="0" dirty="0" smtClean="0">
-              <a:solidFill>
-                <a:schemeClr val="tx1"/>
-              </a:solidFill>
-              <a:latin typeface="+mn-lt"/>
-              <a:ea typeface="+mn-ea"/>
-              <a:cs typeface="+mn-cs"/>
-            </a:endParaRPr>
-          </a:p>
-          <a:p>
-            <a:r>
-              <a:rPr lang="en-US" altLang="ja-JP" sz="1200" kern="1200" baseline="0" dirty="0" smtClean="0">
-                <a:solidFill>
-                  <a:schemeClr val="tx1"/>
-                </a:solidFill>
-                <a:latin typeface="+mn-lt"/>
-                <a:ea typeface="+mn-ea"/>
-                <a:cs typeface="+mn-cs"/>
-              </a:rPr>
-              <a:t>Super easy to use, low technical barrier to entry, we take care of all the nuances of setup</a:t>
-            </a:r>
-          </a:p>
-          <a:p>
-            <a:pPr marL="171450" indent="-171450">
-              <a:buFontTx/>
-              <a:buChar char="-"/>
-            </a:pPr>
-            <a:r>
-              <a:rPr lang="en-US" altLang="ja-JP" sz="1200" kern="1200" baseline="0" dirty="0" smtClean="0">
-                <a:solidFill>
-                  <a:schemeClr val="tx1"/>
-                </a:solidFill>
-                <a:latin typeface="+mn-lt"/>
-                <a:ea typeface="+mn-ea"/>
-                <a:cs typeface="+mn-cs"/>
-              </a:rPr>
-              <a:t>Getting online, provide ready-to-install apps, dependency management</a:t>
-            </a:r>
-          </a:p>
-          <a:p>
-            <a:pPr marL="171450" indent="-171450">
-              <a:buFontTx/>
-              <a:buChar char="-"/>
-            </a:pPr>
-            <a:endParaRPr lang="en-US" altLang="ja-JP" sz="1200" kern="1200" baseline="0" dirty="0" smtClean="0">
-              <a:solidFill>
-                <a:schemeClr val="tx1"/>
-              </a:solidFill>
-              <a:latin typeface="+mn-lt"/>
-              <a:ea typeface="+mn-ea"/>
-              <a:cs typeface="+mn-cs"/>
-            </a:endParaRPr>
-          </a:p>
-          <a:p>
             <a:pPr marL="0" indent="0">
               <a:buFontTx/>
               <a:buNone/>
             </a:pPr>
             <a:r>
-              <a:rPr lang="en-US" altLang="ja-JP" sz="1200" kern="1200" baseline="0" dirty="0" smtClean="0">
-                <a:solidFill>
-                  <a:schemeClr val="tx1"/>
-                </a:solidFill>
-                <a:latin typeface="+mn-lt"/>
-                <a:ea typeface="+mn-ea"/>
-                <a:cs typeface="+mn-cs"/>
-              </a:rPr>
-              <a:t>We provide API and tools so that third-party developers can easy bundle new apps</a:t>
+              <a:rPr lang="en-US" dirty="0" smtClean="0"/>
+              <a:t>While</a:t>
+            </a:r>
+            <a:r>
+              <a:rPr lang="en-US" baseline="0" dirty="0" smtClean="0"/>
+              <a:t> performing market research, we came across several related products.</a:t>
+            </a:r>
+          </a:p>
+          <a:p>
+            <a:pPr marL="0" indent="0">
+              <a:buFontTx/>
+              <a:buNone/>
+            </a:pPr>
+            <a:r>
+              <a:rPr lang="en-US" baseline="0" dirty="0" smtClean="0"/>
+              <a:t>These come from well-known competitors such as </a:t>
+            </a:r>
+            <a:r>
+              <a:rPr lang="en-US" baseline="0" dirty="0" err="1" smtClean="0"/>
+              <a:t>Synology</a:t>
+            </a:r>
+            <a:r>
+              <a:rPr lang="en-US" baseline="0" dirty="0" smtClean="0"/>
+              <a:t>, QNAP, and Windows Home Server.</a:t>
+            </a:r>
+          </a:p>
+          <a:p>
+            <a:pPr marL="0" indent="0">
+              <a:buFontTx/>
+              <a:buNone/>
+            </a:pPr>
+            <a:endParaRPr lang="en-US" baseline="0" dirty="0" smtClean="0"/>
+          </a:p>
+          <a:p>
+            <a:pPr marL="0" indent="0">
+              <a:buFontTx/>
+              <a:buNone/>
+            </a:pPr>
+            <a:r>
+              <a:rPr lang="en-US" baseline="0" dirty="0" err="1" smtClean="0"/>
+              <a:t>Synology</a:t>
+            </a:r>
+            <a:r>
+              <a:rPr lang="en-US" baseline="0" dirty="0" smtClean="0"/>
+              <a:t> and QNAP are similar in that they both specialize in Network Attached Storage devices. Their main focus is on a high quality NAS, but they also provide an administrative web platform with their own app stores, making their products hardware/software solutions.</a:t>
+            </a:r>
+          </a:p>
+          <a:p>
+            <a:pPr marL="0" indent="0">
+              <a:buFontTx/>
+              <a:buNone/>
+            </a:pPr>
+            <a:endParaRPr lang="en-US" baseline="0" dirty="0" smtClean="0"/>
+          </a:p>
+          <a:p>
+            <a:pPr marL="0" indent="0">
+              <a:buFontTx/>
+              <a:buNone/>
+            </a:pPr>
+            <a:r>
+              <a:rPr lang="en-US" baseline="0" dirty="0" smtClean="0"/>
+              <a:t>The Windows Home Server is a pure-software solution, but it has been discontinued and is no longer supported.</a:t>
             </a:r>
           </a:p>
         </p:txBody>
@@ -1131,7 +1608,7 @@
           <a:p>
             <a:fld id="{6100224D-0E9C-C04C-8D85-E4CE9ACE5D30}" type="slidenum">
               <a:rPr lang="en-US" smtClean="0"/>
-              <a:t>4</a:t>
+              <a:t>3</a:t>
             </a:fld>
             <a:endParaRPr lang="en-US"/>
           </a:p>
@@ -1194,8 +1671,51 @@
           <a:bodyPr/>
           <a:lstStyle/>
           <a:p>
-            <a:r>
-              <a:rPr lang="en-US" altLang="ja-JP" sz="1200" kern="1200" baseline="0" dirty="0" err="1" smtClean="0">
+            <a:pPr marL="0" marR="0" indent="0" algn="l" defTabSz="457200" rtl="0" eaLnBrk="1" fontAlgn="auto" latinLnBrk="0" hangingPunct="1">
+              <a:lnSpc>
+                <a:spcPct val="100000"/>
+              </a:lnSpc>
+              <a:spcBef>
+                <a:spcPts val="0"/>
+              </a:spcBef>
+              <a:spcAft>
+                <a:spcPts val="0"/>
+              </a:spcAft>
+              <a:buClrTx/>
+              <a:buSzTx/>
+              <a:buFontTx/>
+              <a:buNone/>
+              <a:tabLst/>
+              <a:defRPr/>
+            </a:pPr>
+            <a:r>
+              <a:rPr lang="en-US" baseline="0" dirty="0" smtClean="0"/>
+              <a:t>We intend to differentiate from these products by targeting a specific audience that they do not reach.</a:t>
+            </a:r>
+          </a:p>
+          <a:p>
+            <a:pPr marL="0" marR="0" indent="0" algn="l" defTabSz="457200" rtl="0" eaLnBrk="1" fontAlgn="auto" latinLnBrk="0" hangingPunct="1">
+              <a:lnSpc>
+                <a:spcPct val="100000"/>
+              </a:lnSpc>
+              <a:spcBef>
+                <a:spcPts val="0"/>
+              </a:spcBef>
+              <a:spcAft>
+                <a:spcPts val="0"/>
+              </a:spcAft>
+              <a:buClrTx/>
+              <a:buSzTx/>
+              <a:buFontTx/>
+              <a:buNone/>
+              <a:tabLst/>
+              <a:defRPr/>
+            </a:pPr>
+            <a:endParaRPr lang="en-US" dirty="0" smtClean="0"/>
+          </a:p>
+          <a:p>
+            <a:r>
+              <a:rPr lang="en-US" altLang="ja-JP" sz="1200" kern="1200" baseline="0" dirty="0" smtClean="0">
                 <a:solidFill>
                   <a:schemeClr val="tx1"/>
                 </a:solidFill>
@@ -1203,8 +1723,20 @@
                 <a:ea typeface="+mn-ea"/>
                 <a:cs typeface="+mn-cs"/>
               </a:rPr>
-              <a:t>Git</a:t>
-            </a:r>
+              <a:t>Our focus is on being affordable, simple, and extensible.</a:t>
+            </a:r>
+          </a:p>
+          <a:p>
+            <a:endParaRPr lang="en-US" altLang="ja-JP" sz="1200" kern="1200" baseline="0" dirty="0" smtClean="0">
+              <a:solidFill>
+                <a:schemeClr val="tx1"/>
+              </a:solidFill>
+              <a:latin typeface="+mn-lt"/>
+              <a:ea typeface="+mn-ea"/>
+              <a:cs typeface="+mn-cs"/>
+            </a:endParaRPr>
+          </a:p>
+          <a:p>
             <a:r>
               <a:rPr lang="en-US" altLang="ja-JP" sz="1200" kern="1200" baseline="0" dirty="0" smtClean="0">
                 <a:solidFill>
@@ -1214,16 +1746,10 @@
                 <a:ea typeface="+mn-ea"/>
                 <a:cs typeface="+mn-cs"/>
               </a:rPr>
-              <a:t> flow</a:t>
-            </a:r>
-          </a:p>
-          <a:p>
-            <a:pPr marL="171450" indent="-171450">
-              <a:buFontTx/>
-              <a:buChar char="-"/>
-            </a:pPr>
-            <a:r>
-              <a:rPr lang="en-US" altLang="ja-JP" sz="1200" kern="1200" baseline="0" dirty="0" smtClean="0">
+              <a:t>Firstly, we’re aiming for a much lower price point. We’re looking at about 50$, which is very inexpensive and low-risk, compared to </a:t>
+            </a:r>
+            <a:r>
+              <a:rPr lang="en-US" altLang="ja-JP" sz="1200" kern="1200" baseline="0" dirty="0" err="1" smtClean="0">
                 <a:solidFill>
                   <a:schemeClr val="tx1"/>
                 </a:solidFill>
@@ -1231,10 +1757,10 @@
                 <a:ea typeface="+mn-ea"/>
                 <a:cs typeface="+mn-cs"/>
               </a:rPr>
-              <a:t>Each feature is </a:t>
-            </a:r>
-            <a:r>
-              <a:rPr lang="en-US" altLang="ja-JP" sz="1200" kern="1200" baseline="0" dirty="0" err="1" smtClean="0">
+              <a:t>Synology</a:t>
+            </a:r>
+            <a:r>
+              <a:rPr lang="en-US" altLang="ja-JP" sz="1200" kern="1200" baseline="0" dirty="0" smtClean="0">
                 <a:solidFill>
                   <a:schemeClr val="tx1"/>
                 </a:solidFill>
@@ -1242,8 +1768,20 @@
                 <a:ea typeface="+mn-ea"/>
                 <a:cs typeface="+mn-cs"/>
               </a:rPr>
-              <a:t>dev</a:t>
-            </a:r>
+              <a:t> and QNAP. A NAS from one of these companies could be one-hundred to two-hundred, or even several hundred dollars.</a:t>
+            </a:r>
+          </a:p>
+          <a:p>
+            <a:endParaRPr lang="en-US" altLang="ja-JP" sz="1200" kern="1200" baseline="0" dirty="0" smtClean="0">
+              <a:solidFill>
+                <a:schemeClr val="tx1"/>
+              </a:solidFill>
+              <a:latin typeface="+mn-lt"/>
+              <a:ea typeface="+mn-ea"/>
+              <a:cs typeface="+mn-cs"/>
+            </a:endParaRPr>
+          </a:p>
+          <a:p>
             <a:r>
               <a:rPr lang="en-US" altLang="ja-JP" sz="1200" kern="1200" baseline="0" dirty="0" smtClean="0">
                 <a:solidFill>
@@ -1253,13 +1791,27 @@
                 <a:ea typeface="+mn-ea"/>
                 <a:cs typeface="+mn-cs"/>
               </a:rPr>
-              <a:t> separately on a new local branch</a:t>
-            </a:r>
-          </a:p>
-          <a:p>
-            <a:pPr marL="171450" indent="-171450">
+              <a:t>Secondly, we’re aiming for simplicity. Not only is all of the setup and configuration handled behind the scenes, but we’re stressing a sleek, clean user interface that’s easy to understand and thus easy to use. We help the user get online, provide ready-to-install web applications, and the user won’t have to worry, or even know, about all of the dependency management we’re taking care of. It’s a super low technical barrier-to-entry.</a:t>
+            </a:r>
+          </a:p>
+          <a:p>
+            <a:pPr marL="0" indent="0">
               <a:buFontTx/>
-              <a:buChar char="-"/>
+              <a:buNone/>
+            </a:pPr>
+            <a:endParaRPr lang="en-US" altLang="ja-JP" sz="1200" kern="1200" baseline="0" dirty="0" smtClean="0">
+              <a:solidFill>
+                <a:schemeClr val="tx1"/>
+              </a:solidFill>
+              <a:latin typeface="+mn-lt"/>
+              <a:ea typeface="+mn-ea"/>
+              <a:cs typeface="+mn-cs"/>
+            </a:endParaRPr>
+          </a:p>
+          <a:p>
+            <a:pPr marL="0" indent="0">
+              <a:buFontTx/>
+              <a:buNone/>
             </a:pPr>
             <a:r>
               <a:rPr lang="en-US" altLang="ja-JP" sz="1200" kern="1200" baseline="0" dirty="0" smtClean="0">
@@ -1270,7 +1822,7 @@
                 <a:ea typeface="+mn-ea"/>
                 <a:cs typeface="+mn-cs"/>
               </a:rPr>
-              <a:t>Branch diff sent to </a:t>
+              <a:t>Finally, in addition to the apps we provide to the user, such as </a:t>
             </a:r>
             <a:r>
               <a:rPr lang="en-US" altLang="ja-JP" sz="1200" kern="1200" baseline="0" dirty="0" err="1" smtClean="0">
@@ -1281,7 +1833,7 @@
                 <a:ea typeface="+mn-ea"/>
                 <a:cs typeface="+mn-cs"/>
               </a:rPr>
-              <a:t>Phabricator</a:t>
+              <a:t>Wordpress</a:t>
             </a:r>
             <a:r>
               <a:rPr lang="en-US" altLang="ja-JP" sz="1200" kern="1200" baseline="0" dirty="0" smtClean="0">
@@ -1292,16 +1844,10 @@
                 <a:ea typeface="+mn-ea"/>
                 <a:cs typeface="+mn-cs"/>
               </a:rPr>
-              <a:t> for code review</a:t>
-            </a:r>
-          </a:p>
-          <a:p>
-            <a:pPr marL="171450" indent="-171450">
-              <a:buFontTx/>
-              <a:buChar char="-"/>
-            </a:pPr>
-            <a:r>
-              <a:rPr lang="en-US" altLang="ja-JP" sz="1200" kern="1200" baseline="0" dirty="0" smtClean="0">
+              <a:t> or </a:t>
+            </a:r>
+            <a:r>
+              <a:rPr lang="en-US" altLang="ja-JP" sz="1200" kern="1200" baseline="0" dirty="0" err="1" smtClean="0">
                 <a:solidFill>
                   <a:schemeClr val="tx1"/>
                 </a:solidFill>
@@ -1309,8 +1855,115 @@
                 <a:ea typeface="+mn-ea"/>
                 <a:cs typeface="+mn-cs"/>
               </a:rPr>
-              <a:t>Once approved, system will merge branch into master</a:t>
-            </a:r>
+              <a:t>ownCloud</a:t>
+            </a:r>
+            <a:r>
+              <a:rPr lang="en-US" altLang="ja-JP" sz="1200" kern="1200" baseline="0" dirty="0" smtClean="0">
+                <a:solidFill>
+                  <a:schemeClr val="tx1"/>
+                </a:solidFill>
+                <a:latin typeface="+mn-lt"/>
+                <a:ea typeface="+mn-ea"/>
+                <a:cs typeface="+mn-cs"/>
+              </a:rPr>
+              <a:t>, we </a:t>
+            </a:r>
+            <a:r>
+              <a:rPr lang="en-US" altLang="ja-JP" sz="1200" kern="1200" baseline="0" dirty="0" smtClean="0">
+                <a:solidFill>
+                  <a:schemeClr val="tx1"/>
+                </a:solidFill>
+                <a:latin typeface="+mn-lt"/>
+                <a:ea typeface="+mn-ea"/>
+                <a:cs typeface="+mn-cs"/>
+              </a:rPr>
+              <a:t>provide </a:t>
+            </a:r>
+            <a:r>
+              <a:rPr lang="en-US" altLang="ja-JP" sz="1200" kern="1200" baseline="0" dirty="0" smtClean="0">
+                <a:solidFill>
+                  <a:schemeClr val="tx1"/>
+                </a:solidFill>
+                <a:latin typeface="+mn-lt"/>
+                <a:ea typeface="+mn-ea"/>
+                <a:cs typeface="+mn-cs"/>
+              </a:rPr>
+              <a:t>an API </a:t>
+            </a:r>
+            <a:r>
+              <a:rPr lang="en-US" altLang="ja-JP" sz="1200" kern="1200" baseline="0" dirty="0" smtClean="0">
+                <a:solidFill>
+                  <a:schemeClr val="tx1"/>
+                </a:solidFill>
+                <a:latin typeface="+mn-lt"/>
+                <a:ea typeface="+mn-ea"/>
+                <a:cs typeface="+mn-cs"/>
+              </a:rPr>
+              <a:t>and </a:t>
+            </a:r>
+            <a:r>
+              <a:rPr lang="en-US" altLang="ja-JP" sz="1200" kern="1200" baseline="0" dirty="0" smtClean="0">
+                <a:solidFill>
+                  <a:schemeClr val="tx1"/>
+                </a:solidFill>
+                <a:latin typeface="+mn-lt"/>
+                <a:ea typeface="+mn-ea"/>
+                <a:cs typeface="+mn-cs"/>
+              </a:rPr>
+              <a:t>build tools </a:t>
+            </a:r>
+            <a:r>
+              <a:rPr lang="en-US" altLang="ja-JP" sz="1200" kern="1200" baseline="0" dirty="0" smtClean="0">
+                <a:solidFill>
+                  <a:schemeClr val="tx1"/>
+                </a:solidFill>
+                <a:latin typeface="+mn-lt"/>
+                <a:ea typeface="+mn-ea"/>
+                <a:cs typeface="+mn-cs"/>
+              </a:rPr>
+              <a:t>so that third-party developers can </a:t>
+            </a:r>
+            <a:r>
+              <a:rPr lang="en-US" altLang="ja-JP" sz="1200" kern="1200" baseline="0" dirty="0" smtClean="0">
+                <a:solidFill>
+                  <a:schemeClr val="tx1"/>
+                </a:solidFill>
+                <a:latin typeface="+mn-lt"/>
+                <a:ea typeface="+mn-ea"/>
+                <a:cs typeface="+mn-cs"/>
+              </a:rPr>
+              <a:t>easily </a:t>
+            </a:r>
+            <a:r>
+              <a:rPr lang="en-US" altLang="ja-JP" sz="1200" kern="1200" baseline="0" dirty="0" smtClean="0">
+                <a:solidFill>
+                  <a:schemeClr val="tx1"/>
+                </a:solidFill>
+                <a:latin typeface="+mn-lt"/>
+                <a:ea typeface="+mn-ea"/>
+                <a:cs typeface="+mn-cs"/>
+              </a:rPr>
+              <a:t>bundle new </a:t>
+            </a:r>
+            <a:r>
+              <a:rPr lang="en-US" altLang="ja-JP" sz="1200" kern="1200" baseline="0" dirty="0" smtClean="0">
+                <a:solidFill>
+                  <a:schemeClr val="tx1"/>
+                </a:solidFill>
+                <a:latin typeface="+mn-lt"/>
+                <a:ea typeface="+mn-ea"/>
+                <a:cs typeface="+mn-cs"/>
+              </a:rPr>
+              <a:t>apps. In this way, users have access to an unlimited number of apps.</a:t>
+            </a:r>
+            <a:endParaRPr lang="en-US" altLang="ja-JP" sz="1200" kern="1200" baseline="0" dirty="0" smtClean="0">
+              <a:solidFill>
+                <a:schemeClr val="tx1"/>
+              </a:solidFill>
+              <a:latin typeface="+mn-lt"/>
+              <a:ea typeface="+mn-ea"/>
+              <a:cs typeface="+mn-cs"/>
+            </a:endParaRPr>
           </a:p>
         </p:txBody>
       </p:sp>
@@ -1331,7 +1984,7 @@
           <a:p>
             <a:fld id="{6100224D-0E9C-C04C-8D85-E4CE9ACE5D30}" type="slidenum">
               <a:rPr lang="en-US" smtClean="0"/>
-              <a:t>5</a:t>
+              <a:t>4</a:t>
             </a:fld>
             <a:endParaRPr lang="en-US"/>
           </a:p>
@@ -1403,12 +2056,10 @@
                 <a:ea typeface="+mn-ea"/>
                 <a:cs typeface="+mn-cs"/>
               </a:rPr>
-              <a:t>Workable UI Mockups</a:t>
-            </a:r>
-          </a:p>
-          <a:p>
-            <a:r>
-              <a:rPr lang="en-US" altLang="ja-JP" sz="1200" kern="1200" baseline="0" dirty="0" smtClean="0">
+              <a:t>Our repo is hosted on </a:t>
+            </a:r>
+            <a:r>
+              <a:rPr lang="en-US" altLang="ja-JP" sz="1200" kern="1200" baseline="0" dirty="0" err="1" smtClean="0">
                 <a:solidFill>
                   <a:schemeClr val="tx1"/>
                 </a:solidFill>
@@ -1416,10 +2067,8 @@
                 <a:ea typeface="+mn-ea"/>
                 <a:cs typeface="+mn-cs"/>
               </a:rPr>
-              <a:t>Two Hardware Prototypes</a:t>
-            </a:r>
-          </a:p>
-          <a:p>
+              <a:t>git</a:t>
+            </a:r>
             <a:r>
               <a:rPr lang="en-US" altLang="ja-JP" sz="1200" kern="1200" baseline="0" dirty="0" smtClean="0">
                 <a:solidFill>
@@ -1429,12 +2078,10 @@
                 <a:ea typeface="+mn-ea"/>
                 <a:cs typeface="+mn-cs"/>
               </a:rPr>
-              <a:t>Working Packaging System</a:t>
-            </a:r>
-          </a:p>
-          <a:p>
-            <a:r>
-              <a:rPr lang="en-US" altLang="ja-JP" sz="1200" kern="1200" baseline="0" dirty="0" smtClean="0">
+              <a:t> hub and facilitated through </a:t>
+            </a:r>
+            <a:r>
+              <a:rPr lang="en-US" altLang="ja-JP" sz="1200" kern="1200" baseline="0" dirty="0" err="1" smtClean="0">
                 <a:solidFill>
                   <a:schemeClr val="tx1"/>
                 </a:solidFill>
@@ -1442,10 +2089,8 @@
                 <a:ea typeface="+mn-ea"/>
                 <a:cs typeface="+mn-cs"/>
               </a:rPr>
-              <a:t>Research Competition</a:t>
-            </a:r>
-          </a:p>
-          <a:p>
+              <a:t>Arcanist</a:t>
+            </a:r>
             <a:r>
               <a:rPr lang="en-US" altLang="ja-JP" sz="1200" kern="1200" baseline="0" dirty="0" smtClean="0">
                 <a:solidFill>
@@ -1455,12 +2100,10 @@
                 <a:ea typeface="+mn-ea"/>
                 <a:cs typeface="+mn-cs"/>
               </a:rPr>
-              <a:t>Basic Admin Web Server</a:t>
-            </a:r>
-          </a:p>
-          <a:p>
-            <a:r>
-              <a:rPr lang="en-US" altLang="ja-JP" sz="1200" kern="1200" baseline="0" dirty="0" smtClean="0">
+              <a:t> and </a:t>
+            </a:r>
+            <a:r>
+              <a:rPr lang="en-US" altLang="ja-JP" sz="1200" kern="1200" baseline="0" dirty="0" err="1" smtClean="0">
                 <a:solidFill>
                   <a:schemeClr val="tx1"/>
                 </a:solidFill>
@@ -1468,7 +2111,196 @@
                 <a:ea typeface="+mn-ea"/>
                 <a:cs typeface="+mn-cs"/>
               </a:rPr>
-              <a:t>Consult Customers</a:t>
+              <a:t>Phabricator</a:t>
+            </a:r>
+            <a:endParaRPr lang="en-US" altLang="ja-JP" sz="1200" kern="1200" baseline="0" dirty="0" smtClean="0">
+              <a:solidFill>
+                <a:schemeClr val="tx1"/>
+              </a:solidFill>
+              <a:latin typeface="+mn-lt"/>
+              <a:ea typeface="+mn-ea"/>
+              <a:cs typeface="+mn-cs"/>
+            </a:endParaRPr>
+          </a:p>
+          <a:p>
+            <a:endParaRPr lang="en-US" altLang="ja-JP" sz="1200" kern="1200" baseline="0" dirty="0" smtClean="0">
+              <a:solidFill>
+                <a:schemeClr val="tx1"/>
+              </a:solidFill>
+              <a:latin typeface="+mn-lt"/>
+              <a:ea typeface="+mn-ea"/>
+              <a:cs typeface="+mn-cs"/>
+            </a:endParaRPr>
+          </a:p>
+          <a:p>
+            <a:r>
+              <a:rPr lang="en-US" altLang="ja-JP" sz="1200" kern="1200" baseline="0" dirty="0" smtClean="0">
+                <a:solidFill>
+                  <a:schemeClr val="tx1"/>
+                </a:solidFill>
+                <a:latin typeface="+mn-lt"/>
+                <a:ea typeface="+mn-ea"/>
+                <a:cs typeface="+mn-cs"/>
+              </a:rPr>
+              <a:t>The </a:t>
+            </a:r>
+            <a:r>
+              <a:rPr lang="en-US" altLang="ja-JP" sz="1200" kern="1200" baseline="0" dirty="0" err="1" smtClean="0">
+                <a:solidFill>
+                  <a:schemeClr val="tx1"/>
+                </a:solidFill>
+                <a:latin typeface="+mn-lt"/>
+                <a:ea typeface="+mn-ea"/>
+                <a:cs typeface="+mn-cs"/>
+              </a:rPr>
+              <a:t>Git</a:t>
+            </a:r>
+            <a:r>
+              <a:rPr lang="en-US" altLang="ja-JP" sz="1200" kern="1200" baseline="0" dirty="0" smtClean="0">
+                <a:solidFill>
+                  <a:schemeClr val="tx1"/>
+                </a:solidFill>
+                <a:latin typeface="+mn-lt"/>
+                <a:ea typeface="+mn-ea"/>
+                <a:cs typeface="+mn-cs"/>
+              </a:rPr>
+              <a:t> work flow is as follows</a:t>
+            </a:r>
+            <a:endParaRPr lang="en-US" altLang="ja-JP" sz="1200" kern="1200" baseline="0" dirty="0" smtClean="0">
+              <a:solidFill>
+                <a:schemeClr val="tx1"/>
+              </a:solidFill>
+              <a:latin typeface="+mn-lt"/>
+              <a:ea typeface="+mn-ea"/>
+              <a:cs typeface="+mn-cs"/>
+            </a:endParaRPr>
+          </a:p>
+          <a:p>
+            <a:pPr marL="171450" indent="-171450">
+              <a:buFontTx/>
+              <a:buChar char="-"/>
+            </a:pPr>
+            <a:r>
+              <a:rPr lang="en-US" altLang="ja-JP" sz="1200" kern="1200" baseline="0" dirty="0" smtClean="0">
+                <a:solidFill>
+                  <a:schemeClr val="tx1"/>
+                </a:solidFill>
+                <a:latin typeface="+mn-lt"/>
+                <a:ea typeface="+mn-ea"/>
+                <a:cs typeface="+mn-cs"/>
+              </a:rPr>
+              <a:t>Each feature is </a:t>
+            </a:r>
+            <a:r>
+              <a:rPr lang="en-US" altLang="ja-JP" sz="1200" kern="1200" baseline="0" dirty="0" smtClean="0">
+                <a:solidFill>
+                  <a:schemeClr val="tx1"/>
+                </a:solidFill>
+                <a:latin typeface="+mn-lt"/>
+                <a:ea typeface="+mn-ea"/>
+                <a:cs typeface="+mn-cs"/>
+              </a:rPr>
+              <a:t>developed </a:t>
+            </a:r>
+            <a:r>
+              <a:rPr lang="en-US" altLang="ja-JP" sz="1200" kern="1200" baseline="0" dirty="0" smtClean="0">
+                <a:solidFill>
+                  <a:schemeClr val="tx1"/>
+                </a:solidFill>
+                <a:latin typeface="+mn-lt"/>
+                <a:ea typeface="+mn-ea"/>
+                <a:cs typeface="+mn-cs"/>
+              </a:rPr>
+              <a:t>separately on a new local branch</a:t>
+            </a:r>
+          </a:p>
+          <a:p>
+            <a:pPr marL="171450" indent="-171450">
+              <a:buFontTx/>
+              <a:buChar char="-"/>
+            </a:pPr>
+            <a:r>
+              <a:rPr lang="en-US" altLang="ja-JP" sz="1200" kern="1200" baseline="0" dirty="0" smtClean="0">
+                <a:solidFill>
+                  <a:schemeClr val="tx1"/>
+                </a:solidFill>
+                <a:latin typeface="+mn-lt"/>
+                <a:ea typeface="+mn-ea"/>
+                <a:cs typeface="+mn-cs"/>
+              </a:rPr>
+              <a:t>The branch </a:t>
+            </a:r>
+            <a:r>
+              <a:rPr lang="en-US" altLang="ja-JP" sz="1200" kern="1200" baseline="0" dirty="0" smtClean="0">
+                <a:solidFill>
+                  <a:schemeClr val="tx1"/>
+                </a:solidFill>
+                <a:latin typeface="+mn-lt"/>
+                <a:ea typeface="+mn-ea"/>
+                <a:cs typeface="+mn-cs"/>
+              </a:rPr>
+              <a:t>diff </a:t>
+            </a:r>
+            <a:r>
+              <a:rPr lang="en-US" altLang="ja-JP" sz="1200" kern="1200" baseline="0" dirty="0" smtClean="0">
+                <a:solidFill>
+                  <a:schemeClr val="tx1"/>
+                </a:solidFill>
+                <a:latin typeface="+mn-lt"/>
+                <a:ea typeface="+mn-ea"/>
+                <a:cs typeface="+mn-cs"/>
+              </a:rPr>
+              <a:t>is sent </a:t>
+            </a:r>
+            <a:r>
+              <a:rPr lang="en-US" altLang="ja-JP" sz="1200" kern="1200" baseline="0" dirty="0" smtClean="0">
+                <a:solidFill>
+                  <a:schemeClr val="tx1"/>
+                </a:solidFill>
+                <a:latin typeface="+mn-lt"/>
+                <a:ea typeface="+mn-ea"/>
+                <a:cs typeface="+mn-cs"/>
+              </a:rPr>
+              <a:t>to </a:t>
+            </a:r>
+            <a:r>
+              <a:rPr lang="en-US" altLang="ja-JP" sz="1200" kern="1200" baseline="0" dirty="0" err="1" smtClean="0">
+                <a:solidFill>
+                  <a:schemeClr val="tx1"/>
+                </a:solidFill>
+                <a:latin typeface="+mn-lt"/>
+                <a:ea typeface="+mn-ea"/>
+                <a:cs typeface="+mn-cs"/>
+              </a:rPr>
+              <a:t>Phabricator</a:t>
+            </a:r>
+            <a:r>
+              <a:rPr lang="en-US" altLang="ja-JP" sz="1200" kern="1200" baseline="0" dirty="0" smtClean="0">
+                <a:solidFill>
+                  <a:schemeClr val="tx1"/>
+                </a:solidFill>
+                <a:latin typeface="+mn-lt"/>
+                <a:ea typeface="+mn-ea"/>
+                <a:cs typeface="+mn-cs"/>
+              </a:rPr>
+              <a:t> for code review</a:t>
+            </a:r>
+          </a:p>
+          <a:p>
+            <a:pPr marL="171450" indent="-171450">
+              <a:buFontTx/>
+              <a:buChar char="-"/>
+            </a:pPr>
+            <a:r>
+              <a:rPr lang="en-US" altLang="ja-JP" sz="1200" kern="1200" baseline="0" dirty="0" smtClean="0">
+                <a:solidFill>
+                  <a:schemeClr val="tx1"/>
+                </a:solidFill>
+                <a:latin typeface="+mn-lt"/>
+                <a:ea typeface="+mn-ea"/>
+                <a:cs typeface="+mn-cs"/>
+              </a:rPr>
+              <a:t>Once approved, system will merge branch into master</a:t>
             </a:r>
           </a:p>
         </p:txBody>
@@ -1490,7 +2322,7 @@
           <a:p>
             <a:fld id="{6100224D-0E9C-C04C-8D85-E4CE9ACE5D30}" type="slidenum">
               <a:rPr lang="en-US" smtClean="0"/>
-              <a:t>6</a:t>
+              <a:t>5</a:t>
             </a:fld>
             <a:endParaRPr lang="en-US"/>
           </a:p>
@@ -1574,13 +2406,12 @@
                 <a:latin typeface="+mn-lt"/>
                 <a:ea typeface="+mn-ea"/>
                 <a:cs typeface="+mn-cs"/>
-              </a:rPr>
-              <a:t>Mock Up wiki</a:t>
-            </a:r>
-          </a:p>
-          <a:p>
-            <a:r>
-              <a:rPr lang="en-US" altLang="ja-JP" sz="1200" kern="1200" baseline="0" dirty="0" err="1" smtClean="0">
+                <a:sym typeface="Wingdings"/>
+              </a:rPr>
+              <a:t></a:t>
+            </a:r>
+            <a:r>
+              <a:rPr lang="en-US" altLang="ja-JP" sz="1200" kern="1200" baseline="0" dirty="0" smtClean="0">
                 <a:solidFill>
                   <a:schemeClr val="tx1"/>
                 </a:solidFill>
@@ -1588,7 +2419,29 @@
                 <a:ea typeface="+mn-ea"/>
                 <a:cs typeface="+mn-cs"/>
               </a:rPr>
-              <a:t>Slowvotes</a:t>
+              <a:t> URL will take us to </a:t>
+            </a:r>
+            <a:r>
+              <a:rPr lang="en-US" altLang="ja-JP" sz="1200" kern="1200" baseline="0" dirty="0" err="1" smtClean="0">
+                <a:solidFill>
+                  <a:schemeClr val="tx1"/>
+                </a:solidFill>
+                <a:latin typeface="+mn-lt"/>
+                <a:ea typeface="+mn-ea"/>
+                <a:cs typeface="+mn-cs"/>
+              </a:rPr>
+              <a:t>Phriction</a:t>
+            </a:r>
+            <a:r>
+              <a:rPr lang="en-US" altLang="ja-JP" sz="1200" kern="1200" baseline="0" dirty="0" smtClean="0">
+                <a:solidFill>
+                  <a:schemeClr val="tx1"/>
+                </a:solidFill>
+                <a:latin typeface="+mn-lt"/>
+                <a:ea typeface="+mn-ea"/>
+                <a:cs typeface="+mn-cs"/>
+              </a:rPr>
+              <a:t>, where we have a compilation of our current mock ups for the finished product</a:t>
             </a:r>
             <a:endParaRPr lang="en-US" altLang="ja-JP" sz="1200" kern="1200" baseline="0" dirty="0" smtClean="0">
               <a:solidFill>
@@ -1599,6 +2452,50 @@
               <a:cs typeface="+mn-cs"/>
             </a:endParaRPr>
           </a:p>
+          <a:p>
+            <a:r>
+              <a:rPr lang="en-US" altLang="ja-JP" sz="1200" kern="1200" baseline="0" dirty="0" smtClean="0">
+                <a:solidFill>
+                  <a:schemeClr val="tx1"/>
+                </a:solidFill>
+                <a:latin typeface="+mn-lt"/>
+                <a:ea typeface="+mn-ea"/>
+                <a:cs typeface="+mn-cs"/>
+                <a:sym typeface="Wingdings"/>
+              </a:rPr>
+              <a:t> We should show off </a:t>
+            </a:r>
+            <a:r>
+              <a:rPr lang="en-US" altLang="ja-JP" sz="1200" kern="1200" baseline="0" dirty="0" err="1" smtClean="0">
+                <a:solidFill>
+                  <a:schemeClr val="tx1"/>
+                </a:solidFill>
+                <a:latin typeface="+mn-lt"/>
+                <a:ea typeface="+mn-ea"/>
+                <a:cs typeface="+mn-cs"/>
+              </a:rPr>
+              <a:t>Slowvotes</a:t>
+            </a:r>
+            <a:r>
+              <a:rPr lang="en-US" altLang="ja-JP" sz="1200" kern="1200" baseline="0" dirty="0" smtClean="0">
+                <a:solidFill>
+                  <a:schemeClr val="tx1"/>
+                </a:solidFill>
+                <a:latin typeface="+mn-lt"/>
+                <a:ea typeface="+mn-ea"/>
+                <a:cs typeface="+mn-cs"/>
+              </a:rPr>
+              <a:t> so they can see how our deliberation process works</a:t>
+            </a:r>
+            <a:endParaRPr lang="en-US" altLang="ja-JP" sz="1200" kern="1200" baseline="0" dirty="0" smtClean="0">
+              <a:solidFill>
+                <a:schemeClr val="tx1"/>
+              </a:solidFill>
+              <a:latin typeface="+mn-lt"/>
+              <a:ea typeface="+mn-ea"/>
+              <a:cs typeface="+mn-cs"/>
+            </a:endParaRPr>
+          </a:p>
         </p:txBody>
       </p:sp>
       <p:sp>
@@ -1618,7 +2515,7 @@
           <a:p>
             <a:fld id="{6100224D-0E9C-C04C-8D85-E4CE9ACE5D30}" type="slidenum">
               <a:rPr lang="en-US" smtClean="0"/>
-              <a:t>7</a:t>
+              <a:t>6</a:t>
             </a:fld>
             <a:endParaRPr lang="en-US"/>
           </a:p>
@@ -1683,22 +2580,68 @@
           <a:p>
             <a:r>
               <a:rPr lang="en-US" dirty="0" smtClean="0"/>
-              <a:t>Maven,</a:t>
+              <a:t>Here is a list</a:t>
             </a:r>
             <a:r>
               <a:rPr lang="en-US" baseline="0" dirty="0" smtClean="0"/>
-              <a:t> Python Setup Tools, </a:t>
+              <a:t> of the technologies we’re working with:</a:t>
+            </a:r>
+          </a:p>
+          <a:p>
+            <a:r>
+              <a:rPr lang="en-US" baseline="0" dirty="0" smtClean="0"/>
+              <a:t>We’re using </a:t>
             </a:r>
             <a:r>
               <a:rPr lang="en-US" baseline="0" dirty="0" err="1" smtClean="0"/>
-              <a:t>Init</a:t>
+              <a:t>Phabricator</a:t>
             </a:r>
             <a:r>
               <a:rPr lang="en-US" baseline="0" dirty="0" smtClean="0"/>
-              <a:t> Script (Bootstrap)</a:t>
-            </a:r>
-          </a:p>
-          <a:p>
+              <a:t> to handle our project organization, including code reviews, voting on design alternatives, and work history</a:t>
+            </a:r>
+          </a:p>
+          <a:p>
+            <a:endParaRPr lang="en-US" baseline="0" dirty="0" smtClean="0"/>
+          </a:p>
+          <a:p>
+            <a:r>
+              <a:rPr lang="en-US" baseline="0" dirty="0" smtClean="0"/>
+              <a:t>For the web server, we’re using Maven for dependency management and project building. Our web interface itself is constructed using Google Web Toolkit. And our actual web server is being hosted using Jetty.</a:t>
+            </a:r>
+          </a:p>
+          <a:p>
+            <a:endParaRPr lang="en-US" baseline="0" dirty="0" smtClean="0"/>
+          </a:p>
+          <a:p>
+            <a:r>
+              <a:rPr lang="en-US" baseline="0" dirty="0" smtClean="0"/>
+              <a:t>Our back end is running with Python3 </a:t>
+            </a:r>
+            <a:r>
+              <a:rPr lang="en-US" baseline="0" dirty="0" err="1" smtClean="0"/>
+              <a:t>setuptools</a:t>
+            </a:r>
+            <a:r>
+              <a:rPr lang="en-US" baseline="0" dirty="0" smtClean="0"/>
+              <a:t>. Testing is done with </a:t>
+            </a:r>
+            <a:r>
+              <a:rPr lang="en-US" baseline="0" dirty="0" err="1" smtClean="0"/>
+              <a:t>Pyunit</a:t>
+            </a:r>
+            <a:r>
+              <a:rPr lang="en-US" baseline="0" dirty="0" smtClean="0"/>
+              <a:t>. And the hardware is set up using a custom bootstrap script which takes a fresh </a:t>
+            </a:r>
+            <a:r>
+              <a:rPr lang="en-US" baseline="0" dirty="0" err="1" smtClean="0"/>
+              <a:t>Debian</a:t>
+            </a:r>
+            <a:r>
+              <a:rPr lang="en-US" baseline="0" dirty="0" smtClean="0"/>
+              <a:t> install and configures it into a workable state.</a:t>
+            </a:r>
             <a:endParaRPr lang="en-US" baseline="0" dirty="0" smtClean="0"/>
           </a:p>
           <a:p>
@@ -1723,7 +2666,7 @@
           <a:p>
             <a:fld id="{6100224D-0E9C-C04C-8D85-E4CE9ACE5D30}" type="slidenum">
               <a:rPr lang="en-US" smtClean="0"/>
-              <a:t>8</a:t>
+              <a:t>7</a:t>
             </a:fld>
             <a:endParaRPr lang="en-US"/>
           </a:p>
@@ -1788,28 +2731,75 @@
           <a:p>
             <a:r>
               <a:rPr lang="en-US" dirty="0" smtClean="0"/>
-              <a:t>Hardware</a:t>
-            </a:r>
-          </a:p>
-          <a:p>
-            <a:r>
-              <a:rPr lang="en-US" dirty="0" smtClean="0"/>
-              <a:t>OS</a:t>
-            </a:r>
-          </a:p>
-          <a:p>
-            <a:r>
-              <a:rPr lang="en-US" dirty="0" smtClean="0"/>
-              <a:t>Specs (rasp </a:t>
-            </a:r>
-            <a:r>
-              <a:rPr lang="en-US" dirty="0" err="1" smtClean="0"/>
-              <a:t>vs</a:t>
-            </a:r>
-            <a:r>
-              <a:rPr lang="en-US" dirty="0" smtClean="0"/>
-              <a:t> QB)</a:t>
-            </a:r>
+              <a:t>For hardware,</a:t>
+            </a:r>
+            <a:r>
+              <a:rPr lang="en-US" baseline="0" dirty="0" smtClean="0"/>
+              <a:t> we started with a Raspberry Pi Model B and picked up a </a:t>
+            </a:r>
+            <a:r>
+              <a:rPr lang="en-US" baseline="0" dirty="0" err="1" smtClean="0"/>
+              <a:t>Cubieboard</a:t>
+            </a:r>
+            <a:r>
+              <a:rPr lang="en-US" baseline="0" dirty="0" smtClean="0"/>
+              <a:t> 2 as an alternative.</a:t>
+            </a:r>
+          </a:p>
+          <a:p>
+            <a:r>
+              <a:rPr lang="en-US" baseline="0" dirty="0" smtClean="0"/>
+              <a:t>We’re currently developing on both to consider the differences and how the difference hardware specifications affect the course of our development.</a:t>
+            </a:r>
+          </a:p>
+          <a:p>
+            <a:r>
+              <a:rPr lang="en-US" baseline="0" dirty="0" smtClean="0"/>
+              <a:t>Overall, the </a:t>
+            </a:r>
+            <a:r>
+              <a:rPr lang="en-US" baseline="0" dirty="0" err="1" smtClean="0"/>
+              <a:t>Cubieboard’s</a:t>
+            </a:r>
+            <a:r>
+              <a:rPr lang="en-US" baseline="0" dirty="0" smtClean="0"/>
+              <a:t> processor is slightly more powerful, but we can match a similar strength on the Raspberry Pi by overclocking it.</a:t>
+            </a:r>
+          </a:p>
+          <a:p>
+            <a:r>
+              <a:rPr lang="en-US" baseline="0" dirty="0" smtClean="0"/>
+              <a:t>The Raspberry Pi comes with about half as much memory as the </a:t>
+            </a:r>
+            <a:r>
+              <a:rPr lang="en-US" baseline="0" dirty="0" err="1" smtClean="0"/>
+              <a:t>Cubieboard</a:t>
+            </a:r>
+            <a:r>
+              <a:rPr lang="en-US" baseline="0" dirty="0" smtClean="0"/>
+              <a:t>.</a:t>
+            </a:r>
+          </a:p>
+          <a:p>
+            <a:r>
+              <a:rPr lang="en-US" baseline="0" dirty="0" smtClean="0"/>
+              <a:t>However, while the </a:t>
+            </a:r>
+            <a:r>
+              <a:rPr lang="en-US" baseline="0" dirty="0" err="1" smtClean="0"/>
+              <a:t>Cubieboard’s</a:t>
+            </a:r>
+            <a:r>
+              <a:rPr lang="en-US" baseline="0" dirty="0" smtClean="0"/>
+              <a:t> specifications are generally higher, it comes at a literal cost of… Cost.</a:t>
+            </a:r>
+          </a:p>
+          <a:p>
+            <a:r>
+              <a:rPr lang="en-US" baseline="0" dirty="0" smtClean="0"/>
+              <a:t>Averaging about 60$, we instantly overshoot our targeted price point of roughly 50$, so we’d like to try further optimizations on the Raspberry Pi before switching to this alternative.</a:t>
+            </a:r>
+            <a:endParaRPr lang="en-US" dirty="0" smtClean="0"/>
           </a:p>
         </p:txBody>
       </p:sp>
@@ -1830,7 +2820,7 @@
           <a:p>
             <a:fld id="{6100224D-0E9C-C04C-8D85-E4CE9ACE5D30}" type="slidenum">
               <a:rPr lang="en-US" smtClean="0"/>
-              <a:t>9</a:t>
+              <a:t>8</a:t>
             </a:fld>
             <a:endParaRPr lang="en-US"/>
           </a:p>
@@ -1894,57 +2884,76 @@
           <a:lstStyle/>
           <a:p>
             <a:r>
-              <a:rPr lang="en-US" dirty="0" smtClean="0"/>
-              <a:t>How awesome the packaging system</a:t>
-            </a:r>
-            <a:r>
               <a:rPr lang="en-US" baseline="0" dirty="0" smtClean="0"/>
-              <a:t> is</a:t>
-            </a:r>
-          </a:p>
-          <a:p>
-            <a:pPr marL="171450" indent="-171450">
-              <a:buFontTx/>
-              <a:buChar char="-"/>
-            </a:pPr>
+              <a:t>So, for our front end, we’re writing the web interface in Java with Google Web Toolkit.</a:t>
+            </a:r>
+          </a:p>
+          <a:p>
             <a:r>
               <a:rPr lang="en-US" baseline="0" dirty="0" smtClean="0"/>
-              <a:t>Applications are bundles containing an installation script and an configuration files needed for setup</a:t>
-            </a:r>
-          </a:p>
-          <a:p>
-            <a:pPr marL="171450" indent="-171450">
-              <a:buFontTx/>
-              <a:buChar char="-"/>
-            </a:pPr>
+              <a:t>This gives us access to a robust set of widgets and allows us to compile Java code into highly optimized </a:t>
+            </a:r>
+            <a:r>
+              <a:rPr lang="en-US" baseline="0" dirty="0" err="1" smtClean="0"/>
+              <a:t>Javascript</a:t>
+            </a:r>
             <a:r>
               <a:rPr lang="en-US" baseline="0" dirty="0" smtClean="0"/>
-              <a:t>A setup tool exposed via command line will install a specified app</a:t>
-            </a:r>
-          </a:p>
-          <a:p>
-            <a:pPr marL="628650" lvl="1" indent="-171450">
-              <a:buFontTx/>
-              <a:buChar char="-"/>
-            </a:pPr>
+              <a:t>.</a:t>
+            </a:r>
+          </a:p>
+          <a:p>
+            <a:endParaRPr lang="en-US" baseline="0" dirty="0" smtClean="0"/>
+          </a:p>
+          <a:p>
+            <a:r>
+              <a:rPr lang="en-US" baseline="0" dirty="0" smtClean="0"/>
+              <a:t>All of the dependency management for our code is managed by Maven, which also performs our builds. Maven allows us to package our project into a .war file which may then be deployed by Jetty.</a:t>
+            </a:r>
+          </a:p>
+          <a:p>
+            <a:endParaRPr lang="en-US" baseline="0" dirty="0" smtClean="0"/>
+          </a:p>
+          <a:p>
+            <a:r>
+              <a:rPr lang="en-US" baseline="0" dirty="0" smtClean="0"/>
+              <a:t>On our hardware, we’re running </a:t>
+            </a:r>
             <a:r>
               <a:rPr lang="en-US" baseline="0" dirty="0" err="1" smtClean="0"/>
-              <a:t>ai</a:t>
+              <a:t>Debian</a:t>
             </a:r>
             <a:r>
               <a:rPr lang="en-US" baseline="0" dirty="0" smtClean="0"/>
-              <a:t>-get install path/to/package</a:t>
-            </a:r>
-          </a:p>
-          <a:p>
-            <a:pPr marL="171450" lvl="0" indent="-171450">
-              <a:buFontTx/>
-              <a:buChar char="-"/>
-            </a:pPr>
+              <a:t> OS. At the moment, we’re using a regular system, but in the future we’ll be looking to optimize it to make it lighter.</a:t>
+            </a:r>
+          </a:p>
+          <a:p>
+            <a:endParaRPr lang="en-US" baseline="0" dirty="0" smtClean="0"/>
+          </a:p>
+          <a:p>
             <a:r>
               <a:rPr lang="en-US" baseline="0" dirty="0" smtClean="0"/>
-              <a:t>Installation will check an application cache and download the application from a URL provided by the application bundle if necessary</a:t>
-            </a:r>
+              <a:t>Our packaging system runs on Python3, which lets us easily create build tools and expose a simple API for package management.</a:t>
+            </a:r>
+          </a:p>
+          <a:p>
+            <a:endParaRPr lang="en-US" baseline="0" dirty="0" smtClean="0"/>
+          </a:p>
+          <a:p>
+            <a:r>
+              <a:rPr lang="en-US" baseline="0" dirty="0" smtClean="0"/>
+              <a:t>Finally, our web server is using </a:t>
+            </a:r>
+            <a:r>
+              <a:rPr lang="en-US" baseline="0" dirty="0" err="1" smtClean="0"/>
+              <a:t>nginx</a:t>
+            </a:r>
+            <a:r>
+              <a:rPr lang="en-US" baseline="0" dirty="0" smtClean="0"/>
+              <a:t> for serving pages by delegating requests to Jetty, and Jetty, once again, handles the deployment of our project which is written in Java.</a:t>
+            </a:r>
+            <a:endParaRPr lang="en-US" baseline="0" dirty="0" smtClean="0"/>
           </a:p>
         </p:txBody>
       </p:sp>
@@ -1965,7 +2974,7 @@
           <a:p>
             <a:fld id="{6100224D-0E9C-C04C-8D85-E4CE9ACE5D30}" type="slidenum">
               <a:rPr lang="en-US" smtClean="0"/>
-              <a:t>10</a:t>
+              <a:t>9</a:t>
             </a:fld>
             <a:endParaRPr lang="en-US"/>
           </a:p>
@@ -7280,7 +8289,7 @@
                   <a:schemeClr val="bg1"/>
                 </a:solidFill>
               </a:rPr>
-              <a:t>Software Details</a:t>
+              <a:t>Iteration Plan</a:t>
             </a:r>
             <a:endParaRPr lang="en-US" dirty="0">
               <a:solidFill>
@@ -7302,8 +8311,8 @@
         </p:nvSpPr>
         <p:spPr>
           <a:xfrm>
-            <a:off x="881530" y="1987177"/>
-            <a:ext cx="7805270" cy="4138986"/>
+            <a:off x="881530" y="1987176"/>
+            <a:ext cx="7805270" cy="4461601"/>
           </a:xfrm>
         </p:spPr>
         <p:txBody>
@@ -7314,8 +8323,8 @@
               <a:buNone/>
             </a:pPr>
             <a:r>
-              <a:rPr lang="en-US" sz="2800" dirty="0" smtClean="0"/>
-              <a:t>Front End</a:t>
+              <a:rPr lang="en-US" dirty="0" smtClean="0"/>
+              <a:t>☑︎		UI Mockups</a:t>
             </a:r>
           </a:p>
           <a:p>
@@ -7323,8 +8332,8 @@
               <a:buNone/>
             </a:pPr>
             <a:r>
-              <a:rPr lang="en-US" altLang="ja-JP" sz="2800" dirty="0" smtClean="0"/>
-              <a:t>→ Web interface: Java with GWT</a:t>
+              <a:rPr lang="en-US" dirty="0" smtClean="0"/>
+              <a:t>☑︎		Two Hardware Prototypes</a:t>
             </a:r>
           </a:p>
           <a:p>
@@ -7332,23 +8341,26 @@
               <a:buNone/>
             </a:pPr>
             <a:r>
-              <a:rPr lang="en-US" altLang="ja-JP" sz="2800" dirty="0" smtClean="0"/>
-              <a:t>→ Dependency Management / Build: Maven</a:t>
+              <a:rPr lang="en-US" dirty="0" smtClean="0"/>
+              <a:t>☑︎		Packaging System</a:t>
             </a:r>
           </a:p>
           <a:p>
             <a:pPr marL="0" indent="0">
               <a:buNone/>
             </a:pPr>
-            <a:endParaRPr lang="en-US" sz="2800" dirty="0"/>
+            <a:r>
+              <a:rPr lang="en-US" dirty="0" smtClean="0"/>
+              <a:t>☑︎		Market Research</a:t>
+            </a:r>
           </a:p>
           <a:p>
             <a:pPr marL="0" indent="0">
               <a:buNone/>
             </a:pPr>
             <a:r>
-              <a:rPr lang="en-US" sz="2800" dirty="0" smtClean="0"/>
-              <a:t>Back End</a:t>
+              <a:rPr lang="en-US" dirty="0" smtClean="0"/>
+              <a:t>☑︎		Basic Admin Web Server</a:t>
             </a:r>
           </a:p>
           <a:p>
@@ -7356,44 +8368,31 @@
               <a:buNone/>
             </a:pPr>
             <a:r>
-              <a:rPr lang="en-US" altLang="ja-JP" sz="2800" dirty="0" smtClean="0"/>
-              <a:t>→ Operating System: </a:t>
-            </a:r>
-            <a:r>
-              <a:rPr lang="en-US" altLang="ja-JP" sz="2800" dirty="0" err="1" smtClean="0"/>
-              <a:t>Debian</a:t>
-            </a:r>
-            <a:endParaRPr lang="en-US" sz="2800" dirty="0" smtClean="0"/>
+              <a:rPr lang="en-US" dirty="0" smtClean="0"/>
+              <a:t>☐		Consult Customers</a:t>
+            </a:r>
           </a:p>
           <a:p>
             <a:pPr marL="0" indent="0">
               <a:buNone/>
             </a:pPr>
             <a:r>
-              <a:rPr lang="en-US" altLang="ja-JP" sz="2800" dirty="0" smtClean="0"/>
-              <a:t>→ Packaging System: Python3</a:t>
+              <a:rPr lang="en-US" dirty="0" smtClean="0"/>
+              <a:t>☐		Domain Name Service</a:t>
             </a:r>
           </a:p>
           <a:p>
             <a:pPr marL="0" indent="0">
               <a:buNone/>
             </a:pPr>
-            <a:r>
-              <a:rPr lang="en-US" altLang="ja-JP" sz="2800" dirty="0" smtClean="0"/>
-              <a:t>→ Web Server: </a:t>
-            </a:r>
-            <a:r>
-              <a:rPr lang="en-US" altLang="ja-JP" sz="2800" dirty="0" err="1" smtClean="0"/>
-              <a:t>nginx</a:t>
-            </a:r>
-            <a:endParaRPr lang="en-US" sz="2800" dirty="0"/>
+            <a:endParaRPr lang="en-US" dirty="0" smtClean="0"/>
           </a:p>
         </p:txBody>
       </p:sp>
     </p:spTree>
     <p:extLst>
       <p:ext uri="{BB962C8B-B14F-4D97-AF65-F5344CB8AC3E}">
-        <p14:creationId xmlns:p14="http://schemas.microsoft.com/office/powerpoint/2010/main" val="600301554"/>
+        <p14:creationId xmlns:p14="http://schemas.microsoft.com/office/powerpoint/2010/main" val="744395171"/>
       </p:ext>
     </p:extLst>
   </p:cSld>
@@ -9204,19 +10203,20 @@
       </p:grpSpPr>
       <p:sp>
         <p:nvSpPr>
-          <p:cNvPr id="6" name="Round Same Side Corner Rectangle 5"/>
+          <p:cNvPr id="5" name="Rounded Rectangle 4">
+            <a:hlinkClick r:id="rId3"/>
+          </p:cNvPr>
           <p:cNvSpPr/>
           <p:nvPr/>
         </p:nvSpPr>
         <p:spPr>
           <a:xfrm>
-            <a:off x="457200" y="1600200"/>
-            <a:ext cx="8229600" cy="5257800"/>
+            <a:off x="457201" y="2696944"/>
+            <a:ext cx="8229600" cy="1442552"/>
           </a:xfrm>
-          <a:prstGeom prst="round2SameRect">
+          <a:prstGeom prst="roundRect">
             <a:avLst>
-              <a:gd name="adj1" fmla="val 9279"/>
-              <a:gd name="adj2" fmla="val 0"/>
+              <a:gd name="adj" fmla="val 50000"/>
             </a:avLst>
           </a:prstGeom>
           <a:solidFill>
@@ -9253,136 +10253,30 @@
           <a:lstStyle/>
           <a:p>
             <a:pPr algn="ctr"/>
-            <a:endParaRPr lang="en-CA"/>
-          </a:p>
-        </p:txBody>
-      </p:sp>
-      <p:sp>
-        <p:nvSpPr>
-          <p:cNvPr id="2" name="Title 1"/>
-          <p:cNvSpPr>
-            <a:spLocks noGrp="1"/>
-          </p:cNvSpPr>
-          <p:nvPr>
-            <p:ph type="title"/>
-          </p:nvPr>
-        </p:nvSpPr>
-        <p:spPr/>
-        <p:txBody>
-          <a:bodyPr/>
-          <a:lstStyle/>
-          <a:p>
-            <a:pPr algn="l"/>
-            <a:r>
-              <a:rPr lang="en-US" dirty="0" smtClean="0">
-                <a:solidFill>
-                  <a:schemeClr val="bg1"/>
-                </a:solidFill>
-              </a:rPr>
-              <a:t>Iteration Plan</a:t>
-            </a:r>
-            <a:endParaRPr lang="en-US" dirty="0">
+            <a:r>
+              <a:rPr lang="en-US" sz="4400" dirty="0" smtClean="0">
+                <a:solidFill>
+                  <a:srgbClr val="FE9941"/>
+                </a:solidFill>
+                <a:latin typeface="Helvetica Neue Light"/>
+                <a:cs typeface="Helvetica Neue Light"/>
+              </a:rPr>
+              <a:t>User Interface</a:t>
+            </a:r>
+            <a:endParaRPr lang="en-CA" sz="4400" dirty="0">
               <a:solidFill>
-                <a:schemeClr val="bg1"/>
+                <a:srgbClr val="FE9941"/>
               </a:solidFill>
+              <a:latin typeface="Helvetica Neue Light"/>
+              <a:cs typeface="Helvetica Neue Light"/>
             </a:endParaRPr>
-          </a:p>
-        </p:txBody>
-      </p:sp>
-      <p:sp>
-        <p:nvSpPr>
-          <p:cNvPr id="3" name="Content Placeholder 2"/>
-          <p:cNvSpPr>
-            <a:spLocks noGrp="1"/>
-          </p:cNvSpPr>
-          <p:nvPr>
-            <p:ph idx="1"/>
-          </p:nvPr>
-        </p:nvSpPr>
-        <p:spPr>
-          <a:xfrm>
-            <a:off x="881530" y="1987176"/>
-            <a:ext cx="7805270" cy="4461601"/>
-          </a:xfrm>
-        </p:spPr>
-        <p:txBody>
-          <a:bodyPr/>
-          <a:lstStyle/>
-          <a:p>
-            <a:pPr marL="0" indent="0">
-              <a:buNone/>
-            </a:pPr>
-            <a:r>
-              <a:rPr lang="en-US" dirty="0" smtClean="0"/>
-              <a:t>☑︎		UI Mockups</a:t>
-            </a:r>
-          </a:p>
-          <a:p>
-            <a:pPr marL="0" indent="0">
-              <a:buNone/>
-            </a:pPr>
-            <a:r>
-              <a:rPr lang="en-US" dirty="0" smtClean="0"/>
-              <a:t>☑︎		Two Hardware Prototypes</a:t>
-            </a:r>
-          </a:p>
-          <a:p>
-            <a:pPr marL="0" indent="0">
-              <a:buNone/>
-            </a:pPr>
-            <a:r>
-              <a:rPr lang="en-US" dirty="0" smtClean="0"/>
-              <a:t>☑︎		Packaging System</a:t>
-            </a:r>
-          </a:p>
-          <a:p>
-            <a:pPr marL="0" indent="0">
-              <a:buNone/>
-            </a:pPr>
-            <a:r>
-              <a:rPr lang="en-US" dirty="0" smtClean="0"/>
-              <a:t>☑︎		Market Research</a:t>
-            </a:r>
-          </a:p>
-          <a:p>
-            <a:pPr marL="0" indent="0">
-              <a:buNone/>
-            </a:pPr>
-            <a:r>
-              <a:rPr lang="en-US" dirty="0" smtClean="0"/>
-              <a:t>☑︎		Basic Admin Web Server</a:t>
-            </a:r>
-          </a:p>
-          <a:p>
-            <a:pPr marL="0" indent="0">
-              <a:buNone/>
-            </a:pPr>
-            <a:r>
-              <a:rPr lang="en-US" dirty="0" smtClean="0"/>
-              <a:t>☐		Consult Customers</a:t>
-            </a:r>
-          </a:p>
-          <a:p>
-            <a:pPr marL="0" indent="0">
-              <a:buNone/>
-            </a:pPr>
-            <a:r>
-              <a:rPr lang="en-US" dirty="0" smtClean="0"/>
-              <a:t>☐		Domain Name Service</a:t>
-            </a:r>
-          </a:p>
-          <a:p>
-            <a:pPr marL="0" indent="0">
-              <a:buNone/>
-            </a:pPr>
-            <a:endParaRPr lang="en-US" dirty="0" smtClean="0"/>
           </a:p>
         </p:txBody>
       </p:sp>
     </p:spTree>
     <p:extLst>
       <p:ext uri="{BB962C8B-B14F-4D97-AF65-F5344CB8AC3E}">
-        <p14:creationId xmlns:p14="http://schemas.microsoft.com/office/powerpoint/2010/main" val="744395171"/>
+        <p14:creationId xmlns:p14="http://schemas.microsoft.com/office/powerpoint/2010/main" val="913150776"/>
       </p:ext>
     </p:extLst>
   </p:cSld>
@@ -9418,115 +10312,6 @@
       </p:grpSpPr>
       <p:sp>
         <p:nvSpPr>
-          <p:cNvPr id="5" name="Rounded Rectangle 4">
-            <a:hlinkClick r:id="rId3"/>
-          </p:cNvPr>
-          <p:cNvSpPr/>
-          <p:nvPr/>
-        </p:nvSpPr>
-        <p:spPr>
-          <a:xfrm>
-            <a:off x="457201" y="2696944"/>
-            <a:ext cx="8229600" cy="1442552"/>
-          </a:xfrm>
-          <a:prstGeom prst="roundRect">
-            <a:avLst>
-              <a:gd name="adj" fmla="val 50000"/>
-            </a:avLst>
-          </a:prstGeom>
-          <a:solidFill>
-            <a:schemeClr val="bg1">
-              <a:alpha val="80000"/>
-            </a:schemeClr>
-          </a:solidFill>
-          <a:ln>
-            <a:noFill/>
-          </a:ln>
-          <a:effectLst/>
-        </p:spPr>
-        <p:style>
-          <a:lnRef idx="1">
-            <a:schemeClr val="accent1"/>
-          </a:lnRef>
-          <a:fillRef idx="3">
-            <a:schemeClr val="accent1"/>
-          </a:fillRef>
-          <a:effectRef idx="2">
-            <a:schemeClr val="accent1"/>
-          </a:effectRef>
-          <a:fontRef idx="minor">
-            <a:schemeClr val="lt1"/>
-          </a:fontRef>
-        </p:style>
-        <p:txBody>
-          <a:bodyPr rot="0" spcFirstLastPara="0" vertOverflow="overflow" horzOverflow="overflow" vert="horz" wrap="square" lIns="91440" tIns="45720" rIns="91440" bIns="45720" numCol="1" spcCol="0" rtlCol="0" fromWordArt="0" anchor="ctr" anchorCtr="0" forceAA="0" compatLnSpc="1">
-            <a:prstTxWarp prst="textNoShape">
-              <a:avLst/>
-            </a:prstTxWarp>
-            <a:noAutofit/>
-          </a:bodyPr>
-          <a:lstStyle/>
-          <a:p>
-            <a:pPr algn="ctr"/>
-            <a:r>
-              <a:rPr lang="en-US" sz="4400" dirty="0" smtClean="0">
-                <a:solidFill>
-                  <a:srgbClr val="FE9941"/>
-                </a:solidFill>
-                <a:latin typeface="Helvetica Neue Light"/>
-                <a:cs typeface="Helvetica Neue Light"/>
-              </a:rPr>
-              <a:t>User Interface</a:t>
-            </a:r>
-            <a:endParaRPr lang="en-CA" sz="4400" dirty="0">
-              <a:solidFill>
-                <a:srgbClr val="FE9941"/>
-              </a:solidFill>
-              <a:latin typeface="Helvetica Neue Light"/>
-              <a:cs typeface="Helvetica Neue Light"/>
-            </a:endParaRPr>
-          </a:p>
-        </p:txBody>
-      </p:sp>
-    </p:spTree>
-    <p:extLst>
-      <p:ext uri="{BB962C8B-B14F-4D97-AF65-F5344CB8AC3E}">
-        <p14:creationId xmlns:p14="http://schemas.microsoft.com/office/powerpoint/2010/main" val="913150776"/>
-      </p:ext>
-    </p:extLst>
-  </p:cSld>
-  <p:clrMapOvr>
-    <a:masterClrMapping/>
-  </p:clrMapOvr>
-  <p:timing>
-    <p:tnLst>
-      <p:par>
-        <p:cTn xmlns:p14="http://schemas.microsoft.com/office/powerpoint/2010/main" id="1" dur="indefinite" restart="never" nodeType="tmRoot"/>
-      </p:par>
-    </p:tnLst>
-  </p:timing>
-</p:sld>
-</file>
-
-<file path=ppt/slides/slide8.xml><?xml version="1.0" encoding="utf-8"?>
-<p:sld xmlns:a="http://schemas.openxmlformats.org/drawingml/2006/main" xmlns:r="http://schemas.openxmlformats.org/officeDocument/2006/relationships" xmlns:p="http://schemas.openxmlformats.org/presentationml/2006/main">
-  <p:cSld>
-    <p:spTree>
-      <p:nvGrpSpPr>
-        <p:cNvPr id="1" name=""/>
-        <p:cNvGrpSpPr/>
-        <p:nvPr/>
-      </p:nvGrpSpPr>
-      <p:grpSpPr>
-        <a:xfrm>
-          <a:off x="0" y="0"/>
-          <a:ext cx="0" cy="0"/>
-          <a:chOff x="0" y="0"/>
-          <a:chExt cx="0" cy="0"/>
-        </a:xfrm>
-      </p:grpSpPr>
-      <p:sp>
-        <p:nvSpPr>
           <p:cNvPr id="6" name="Round Same Side Corner Rectangle 5"/>
           <p:cNvSpPr/>
           <p:nvPr/>
@@ -9630,7 +10415,7 @@
         </p:spPr>
         <p:txBody>
           <a:bodyPr>
-            <a:normAutofit fontScale="85000" lnSpcReduction="20000"/>
+            <a:normAutofit fontScale="77500" lnSpcReduction="20000"/>
           </a:bodyPr>
           <a:lstStyle/>
           <a:p>
@@ -9690,7 +10475,20 @@
             </a:pPr>
             <a:r>
               <a:rPr lang="en-US" altLang="ja-JP" dirty="0" smtClean="0"/>
-              <a:t>→ Google Web Toolkit</a:t>
+              <a:t>→ Google Web </a:t>
+            </a:r>
+            <a:r>
+              <a:rPr lang="en-US" altLang="ja-JP" dirty="0" smtClean="0"/>
+              <a:t>Toolkit</a:t>
+            </a:r>
+          </a:p>
+          <a:p>
+            <a:pPr marL="0" indent="0">
+              <a:buNone/>
+            </a:pPr>
+            <a:r>
+              <a:rPr lang="en-US" altLang="ja-JP" dirty="0" smtClean="0"/>
+              <a:t>→ Jetty</a:t>
             </a:r>
             <a:endParaRPr lang="en-US" dirty="0" smtClean="0"/>
           </a:p>
@@ -9785,7 +10583,7 @@
 </p:sld>
 </file>
 
-<file path=ppt/slides/slide9.xml><?xml version="1.0" encoding="utf-8"?>
+<file path=ppt/slides/slide8.xml><?xml version="1.0" encoding="utf-8"?>
 <p:sld xmlns:a="http://schemas.openxmlformats.org/drawingml/2006/main" xmlns:r="http://schemas.openxmlformats.org/officeDocument/2006/relationships" xmlns:p="http://schemas.openxmlformats.org/presentationml/2006/main">
   <p:cSld>
     <p:spTree>
@@ -10389,6 +11187,242 @@
     <p:extLst>
       <p:ext uri="{BB962C8B-B14F-4D97-AF65-F5344CB8AC3E}">
         <p14:creationId xmlns:p14="http://schemas.microsoft.com/office/powerpoint/2010/main" val="269767039"/>
+      </p:ext>
+    </p:extLst>
+  </p:cSld>
+  <p:clrMapOvr>
+    <a:masterClrMapping/>
+  </p:clrMapOvr>
+  <p:timing>
+    <p:tnLst>
+      <p:par>
+        <p:cTn xmlns:p14="http://schemas.microsoft.com/office/powerpoint/2010/main" id="1" dur="indefinite" restart="never" nodeType="tmRoot"/>
+      </p:par>
+    </p:tnLst>
+  </p:timing>
+</p:sld>
+</file>
+
+<file path=ppt/slides/slide9.xml><?xml version="1.0" encoding="utf-8"?>
+<p:sld xmlns:a="http://schemas.openxmlformats.org/drawingml/2006/main" xmlns:r="http://schemas.openxmlformats.org/officeDocument/2006/relationships" xmlns:p="http://schemas.openxmlformats.org/presentationml/2006/main">
+  <p:cSld>
+    <p:spTree>
+      <p:nvGrpSpPr>
+        <p:cNvPr id="1" name=""/>
+        <p:cNvGrpSpPr/>
+        <p:nvPr/>
+      </p:nvGrpSpPr>
+      <p:grpSpPr>
+        <a:xfrm>
+          <a:off x="0" y="0"/>
+          <a:ext cx="0" cy="0"/>
+          <a:chOff x="0" y="0"/>
+          <a:chExt cx="0" cy="0"/>
+        </a:xfrm>
+      </p:grpSpPr>
+      <p:sp>
+        <p:nvSpPr>
+          <p:cNvPr id="6" name="Round Same Side Corner Rectangle 5"/>
+          <p:cNvSpPr/>
+          <p:nvPr/>
+        </p:nvSpPr>
+        <p:spPr>
+          <a:xfrm>
+            <a:off x="457200" y="1600200"/>
+            <a:ext cx="8229600" cy="5257800"/>
+          </a:xfrm>
+          <a:prstGeom prst="round2SameRect">
+            <a:avLst>
+              <a:gd name="adj1" fmla="val 9279"/>
+              <a:gd name="adj2" fmla="val 0"/>
+            </a:avLst>
+          </a:prstGeom>
+          <a:solidFill>
+            <a:schemeClr val="bg1">
+              <a:alpha val="80000"/>
+            </a:schemeClr>
+          </a:solidFill>
+          <a:ln>
+            <a:noFill/>
+          </a:ln>
+          <a:effectLst/>
+        </p:spPr>
+        <p:style>
+          <a:lnRef idx="1">
+            <a:schemeClr val="accent1"/>
+          </a:lnRef>
+          <a:fillRef idx="3">
+            <a:schemeClr val="accent1"/>
+          </a:fillRef>
+          <a:effectRef idx="2">
+            <a:schemeClr val="accent1"/>
+          </a:effectRef>
+          <a:fontRef idx="minor">
+            <a:schemeClr val="lt1"/>
+          </a:fontRef>
+        </p:style>
+        <p:txBody>
+          <a:bodyPr rot="0" spcFirstLastPara="0" vertOverflow="overflow" horzOverflow="overflow" vert="horz" wrap="square" lIns="91440" tIns="45720" rIns="91440" bIns="45720" numCol="1" spcCol="0" rtlCol="0" fromWordArt="0" anchor="ctr" anchorCtr="0" forceAA="0" compatLnSpc="1">
+            <a:prstTxWarp prst="textNoShape">
+              <a:avLst/>
+            </a:prstTxWarp>
+            <a:noAutofit/>
+          </a:bodyPr>
+          <a:lstStyle/>
+          <a:p>
+            <a:pPr algn="ctr"/>
+            <a:endParaRPr lang="en-CA"/>
+          </a:p>
+        </p:txBody>
+      </p:sp>
+      <p:sp>
+        <p:nvSpPr>
+          <p:cNvPr id="2" name="Title 1"/>
+          <p:cNvSpPr>
+            <a:spLocks noGrp="1"/>
+          </p:cNvSpPr>
+          <p:nvPr>
+            <p:ph type="title"/>
+          </p:nvPr>
+        </p:nvSpPr>
+        <p:spPr/>
+        <p:txBody>
+          <a:bodyPr/>
+          <a:lstStyle/>
+          <a:p>
+            <a:pPr algn="l"/>
+            <a:r>
+              <a:rPr lang="en-US" dirty="0" smtClean="0">
+                <a:solidFill>
+                  <a:schemeClr val="bg1"/>
+                </a:solidFill>
+              </a:rPr>
+              <a:t>Software Details</a:t>
+            </a:r>
+            <a:endParaRPr lang="en-US" dirty="0">
+              <a:solidFill>
+                <a:schemeClr val="bg1"/>
+              </a:solidFill>
+            </a:endParaRPr>
+          </a:p>
+        </p:txBody>
+      </p:sp>
+      <p:sp>
+        <p:nvSpPr>
+          <p:cNvPr id="3" name="Content Placeholder 2"/>
+          <p:cNvSpPr>
+            <a:spLocks noGrp="1"/>
+          </p:cNvSpPr>
+          <p:nvPr>
+            <p:ph idx="1"/>
+          </p:nvPr>
+        </p:nvSpPr>
+        <p:spPr>
+          <a:xfrm>
+            <a:off x="881530" y="1987177"/>
+            <a:ext cx="7805270" cy="4138986"/>
+          </a:xfrm>
+        </p:spPr>
+        <p:txBody>
+          <a:bodyPr/>
+          <a:lstStyle/>
+          <a:p>
+            <a:pPr marL="0" indent="0">
+              <a:buNone/>
+            </a:pPr>
+            <a:r>
+              <a:rPr lang="en-US" sz="2800" dirty="0" smtClean="0"/>
+              <a:t>Front End</a:t>
+            </a:r>
+          </a:p>
+          <a:p>
+            <a:pPr marL="0" indent="0">
+              <a:buNone/>
+            </a:pPr>
+            <a:r>
+              <a:rPr lang="en-US" altLang="ja-JP" sz="2800" dirty="0" smtClean="0"/>
+              <a:t>→ Web interface: Java with </a:t>
+            </a:r>
+            <a:r>
+              <a:rPr lang="en-US" altLang="ja-JP" sz="2800" dirty="0" smtClean="0"/>
+              <a:t>GWT</a:t>
+            </a:r>
+          </a:p>
+          <a:p>
+            <a:pPr marL="0" indent="0">
+              <a:buNone/>
+            </a:pPr>
+            <a:r>
+              <a:rPr lang="en-US" altLang="ja-JP" sz="2800" dirty="0" smtClean="0"/>
+              <a:t>→ </a:t>
+            </a:r>
+            <a:r>
+              <a:rPr lang="en-US" altLang="ja-JP" sz="2800" dirty="0" smtClean="0"/>
+              <a:t>Dependency Management / Build: Maven</a:t>
+            </a:r>
+          </a:p>
+          <a:p>
+            <a:pPr marL="0" indent="0">
+              <a:buNone/>
+            </a:pPr>
+            <a:endParaRPr lang="en-US" sz="2800" dirty="0"/>
+          </a:p>
+          <a:p>
+            <a:pPr marL="0" indent="0">
+              <a:buNone/>
+            </a:pPr>
+            <a:r>
+              <a:rPr lang="en-US" sz="2800" dirty="0" smtClean="0"/>
+              <a:t>Back End</a:t>
+            </a:r>
+          </a:p>
+          <a:p>
+            <a:pPr marL="0" indent="0">
+              <a:buNone/>
+            </a:pPr>
+            <a:r>
+              <a:rPr lang="en-US" altLang="ja-JP" sz="2800" dirty="0" smtClean="0"/>
+              <a:t>→ Operating System: </a:t>
+            </a:r>
+            <a:r>
+              <a:rPr lang="en-US" altLang="ja-JP" sz="2800" dirty="0" err="1" smtClean="0"/>
+              <a:t>Debian</a:t>
+            </a:r>
+            <a:endParaRPr lang="en-US" sz="2800" dirty="0" smtClean="0"/>
+          </a:p>
+          <a:p>
+            <a:pPr marL="0" indent="0">
+              <a:buNone/>
+            </a:pPr>
+            <a:r>
+              <a:rPr lang="en-US" altLang="ja-JP" sz="2800" dirty="0" smtClean="0"/>
+              <a:t>→ Packaging System: Python3</a:t>
+            </a:r>
+          </a:p>
+          <a:p>
+            <a:pPr marL="0" indent="0">
+              <a:buNone/>
+            </a:pPr>
+            <a:r>
+              <a:rPr lang="en-US" altLang="ja-JP" sz="2800" dirty="0" smtClean="0"/>
+              <a:t>→ Web Server: </a:t>
+            </a:r>
+            <a:r>
+              <a:rPr lang="en-US" altLang="ja-JP" sz="2800" dirty="0" err="1" smtClean="0"/>
+              <a:t>nginx</a:t>
+            </a:r>
+            <a:r>
+              <a:rPr lang="en-US" altLang="ja-JP" sz="2800" dirty="0" smtClean="0"/>
+              <a:t> and Jetty</a:t>
+            </a:r>
+            <a:endParaRPr lang="en-US" sz="2800" dirty="0"/>
+          </a:p>
+        </p:txBody>
+      </p:sp>
+    </p:spTree>
+    <p:extLst>
+      <p:ext uri="{BB962C8B-B14F-4D97-AF65-F5344CB8AC3E}">
+        <p14:creationId xmlns:p14="http://schemas.microsoft.com/office/powerpoint/2010/main" val="600301554"/>
       </p:ext>
     </p:extLst>
   </p:cSld>

</xml_diff>

<commit_message>
added script, just in casies
Summary: I added a .doc with a transcript for the presentation.

Test Plan: Don't worry, I ran spellcheck.

Reviewers: tnu, jane, rpeng

Reviewed By: rpeng

Differential Revision: http://216.58.1.115:9000/D29
</commit_message>
<xml_diff>
--- a/documents/midterm_demo.pptx
+++ b/documents/midterm_demo.pptx
@@ -1030,7 +1030,29 @@
                 <a:ea typeface="+mn-ea"/>
                 <a:cs typeface="+mn-cs"/>
               </a:rPr>
-              <a:t>There are a few objectives which were uncompleted and fall into our backlog.</a:t>
+              <a:t>There are a few </a:t>
+            </a:r>
+            <a:r>
+              <a:rPr lang="en-US" altLang="ja-JP" sz="1200" kern="1200" baseline="0" smtClean="0">
+                <a:solidFill>
+                  <a:schemeClr val="tx1"/>
+                </a:solidFill>
+                <a:latin typeface="+mn-lt"/>
+                <a:ea typeface="+mn-ea"/>
+                <a:cs typeface="+mn-cs"/>
+              </a:rPr>
+              <a:t>objectives that were </a:t>
+            </a:r>
+            <a:r>
+              <a:rPr lang="en-US" altLang="ja-JP" sz="1200" kern="1200" baseline="0" dirty="0" smtClean="0">
+                <a:solidFill>
+                  <a:schemeClr val="tx1"/>
+                </a:solidFill>
+                <a:latin typeface="+mn-lt"/>
+                <a:ea typeface="+mn-ea"/>
+                <a:cs typeface="+mn-cs"/>
+              </a:rPr>
+              <a:t>uncompleted and fall into our backlog.</a:t>
             </a:r>
           </a:p>
           <a:p>
@@ -2164,7 +2186,7 @@
                 <a:ea typeface="+mn-ea"/>
                 <a:cs typeface="+mn-cs"/>
               </a:rPr>
-              <a:t> work flow is as follows</a:t>
+              <a:t> workflow is as follows</a:t>
             </a:r>
             <a:endParaRPr lang="en-US" altLang="ja-JP" sz="1200" kern="1200" baseline="0" dirty="0" smtClean="0">
               <a:solidFill>
@@ -2632,7 +2654,7 @@
             </a:r>
             <a:r>
               <a:rPr lang="en-US" baseline="0" dirty="0" smtClean="0"/>
-              <a:t>. And the hardware is set up using a custom bootstrap script which takes a fresh </a:t>
+              <a:t>. And the hardware is set up using a custom bootstrap script that takes a fresh </a:t>
             </a:r>
             <a:r>
               <a:rPr lang="en-US" baseline="0" dirty="0" err="1" smtClean="0"/>

</xml_diff>